<commit_message>
3/12 9am name change
</commit_message>
<xml_diff>
--- a/Trivia_Maze_Presentation.pptx
+++ b/Trivia_Maze_Presentation.pptx
@@ -219,7 +219,7 @@
           <a:p>
             <a:fld id="{A2BF3456-A29E-41FE-BFB7-B24F24BEE47B}" type="datetimeFigureOut">
               <a:rPr lang="cs-CZ" smtClean="0"/>
-              <a:t>10.03.2021</a:t>
+              <a:t>12.03.2021</a:t>
             </a:fld>
             <a:endParaRPr lang="cs-CZ"/>
           </a:p>
@@ -702,7 +702,7 @@
           <a:p>
             <a:fld id="{1D8BD707-D9CF-40AE-B4C6-C98DA3205C09}" type="datetimeFigureOut">
               <a:rPr lang="en-US" smtClean="0"/>
-              <a:t>3/10/2021</a:t>
+              <a:t>3/12/2021</a:t>
             </a:fld>
             <a:endParaRPr lang="en-US"/>
           </a:p>
@@ -872,7 +872,7 @@
           <a:p>
             <a:fld id="{1D8BD707-D9CF-40AE-B4C6-C98DA3205C09}" type="datetimeFigureOut">
               <a:rPr lang="en-US" smtClean="0"/>
-              <a:t>3/10/2021</a:t>
+              <a:t>3/12/2021</a:t>
             </a:fld>
             <a:endParaRPr lang="en-US"/>
           </a:p>
@@ -1052,7 +1052,7 @@
           <a:p>
             <a:fld id="{1D8BD707-D9CF-40AE-B4C6-C98DA3205C09}" type="datetimeFigureOut">
               <a:rPr lang="en-US" smtClean="0"/>
-              <a:t>3/10/2021</a:t>
+              <a:t>3/12/2021</a:t>
             </a:fld>
             <a:endParaRPr lang="en-US"/>
           </a:p>
@@ -1222,7 +1222,7 @@
           <a:p>
             <a:fld id="{1D8BD707-D9CF-40AE-B4C6-C98DA3205C09}" type="datetimeFigureOut">
               <a:rPr lang="en-US" smtClean="0"/>
-              <a:t>3/10/2021</a:t>
+              <a:t>3/12/2021</a:t>
             </a:fld>
             <a:endParaRPr lang="en-US"/>
           </a:p>
@@ -1468,7 +1468,7 @@
           <a:p>
             <a:fld id="{1D8BD707-D9CF-40AE-B4C6-C98DA3205C09}" type="datetimeFigureOut">
               <a:rPr lang="en-US" smtClean="0"/>
-              <a:t>3/10/2021</a:t>
+              <a:t>3/12/2021</a:t>
             </a:fld>
             <a:endParaRPr lang="en-US"/>
           </a:p>
@@ -1700,7 +1700,7 @@
           <a:p>
             <a:fld id="{1D8BD707-D9CF-40AE-B4C6-C98DA3205C09}" type="datetimeFigureOut">
               <a:rPr lang="en-US" smtClean="0"/>
-              <a:t>3/10/2021</a:t>
+              <a:t>3/12/2021</a:t>
             </a:fld>
             <a:endParaRPr lang="en-US"/>
           </a:p>
@@ -2067,7 +2067,7 @@
           <a:p>
             <a:fld id="{1D8BD707-D9CF-40AE-B4C6-C98DA3205C09}" type="datetimeFigureOut">
               <a:rPr lang="en-US" smtClean="0"/>
-              <a:t>3/10/2021</a:t>
+              <a:t>3/12/2021</a:t>
             </a:fld>
             <a:endParaRPr lang="en-US"/>
           </a:p>
@@ -2185,7 +2185,7 @@
           <a:p>
             <a:fld id="{1D8BD707-D9CF-40AE-B4C6-C98DA3205C09}" type="datetimeFigureOut">
               <a:rPr lang="en-US" smtClean="0"/>
-              <a:t>3/10/2021</a:t>
+              <a:t>3/12/2021</a:t>
             </a:fld>
             <a:endParaRPr lang="en-US"/>
           </a:p>
@@ -2280,7 +2280,7 @@
           <a:p>
             <a:fld id="{1D8BD707-D9CF-40AE-B4C6-C98DA3205C09}" type="datetimeFigureOut">
               <a:rPr lang="en-US" smtClean="0"/>
-              <a:t>3/10/2021</a:t>
+              <a:t>3/12/2021</a:t>
             </a:fld>
             <a:endParaRPr lang="en-US"/>
           </a:p>
@@ -2557,7 +2557,7 @@
           <a:p>
             <a:fld id="{1D8BD707-D9CF-40AE-B4C6-C98DA3205C09}" type="datetimeFigureOut">
               <a:rPr lang="en-US" smtClean="0"/>
-              <a:t>3/10/2021</a:t>
+              <a:t>3/12/2021</a:t>
             </a:fld>
             <a:endParaRPr lang="en-US"/>
           </a:p>
@@ -2813,7 +2813,7 @@
           <a:p>
             <a:fld id="{1D8BD707-D9CF-40AE-B4C6-C98DA3205C09}" type="datetimeFigureOut">
               <a:rPr lang="en-US" smtClean="0"/>
-              <a:t>3/10/2021</a:t>
+              <a:t>3/12/2021</a:t>
             </a:fld>
             <a:endParaRPr lang="en-US"/>
           </a:p>
@@ -3026,7 +3026,7 @@
           <a:p>
             <a:fld id="{1D8BD707-D9CF-40AE-B4C6-C98DA3205C09}" type="datetimeFigureOut">
               <a:rPr lang="en-US" smtClean="0"/>
-              <a:t>3/10/2021</a:t>
+              <a:t>3/12/2021</a:t>
             </a:fld>
             <a:endParaRPr lang="en-US"/>
           </a:p>
@@ -3730,7 +3730,7 @@
                 <a:latin typeface="Source Sans Pro"/>
                 <a:cs typeface="Source Sans Pro"/>
               </a:rPr>
-              <a:t>Rocket Man</a:t>
+              <a:t>Get to Mars!</a:t>
             </a:r>
           </a:p>
           <a:p>
@@ -3993,6 +3993,14 @@
 <file path=ppt/slides/slide2.xml><?xml version="1.0" encoding="utf-8"?>
 <p:sld xmlns:a="http://schemas.openxmlformats.org/drawingml/2006/main" xmlns:r="http://schemas.openxmlformats.org/officeDocument/2006/relationships" xmlns:p="http://schemas.openxmlformats.org/presentationml/2006/main">
   <p:cSld>
+    <p:bg>
+      <p:bgPr>
+        <a:solidFill>
+          <a:schemeClr val="bg1"/>
+        </a:solidFill>
+        <a:effectLst/>
+      </p:bgPr>
+    </p:bg>
     <p:spTree>
       <p:nvGrpSpPr>
         <p:cNvPr id="1" name=""/>
@@ -4211,7 +4219,7 @@
         </p:nvGrpSpPr>
         <p:grpSpPr>
           <a:xfrm>
-            <a:off x="-19844" y="2755900"/>
+            <a:off x="-19844" y="2374900"/>
             <a:ext cx="4876800" cy="828000"/>
             <a:chOff x="-1" y="546100"/>
             <a:chExt cx="4876800" cy="828000"/>
@@ -4456,8 +4464,8 @@
         </p:nvSpPr>
         <p:spPr>
           <a:xfrm>
-            <a:off x="971550" y="1666349"/>
-            <a:ext cx="17220406" cy="251351"/>
+            <a:off x="970756" y="1557723"/>
+            <a:ext cx="17220406" cy="510396"/>
           </a:xfrm>
           <a:prstGeom prst="rect">
             <a:avLst/>
@@ -4478,10 +4486,26 @@
               </a:spcBef>
             </a:pPr>
             <a:r>
+              <a:rPr lang="en-US" sz="1600" spc="-10" dirty="0">
+                <a:cs typeface="Source Sans Pro Light"/>
+              </a:rPr>
+              <a:t>Get to Mars! </a:t>
+            </a:r>
+          </a:p>
+          <a:p>
+            <a:pPr marL="12700" marR="5080" algn="just">
+              <a:lnSpc>
+                <a:spcPct val="100000"/>
+              </a:lnSpc>
+              <a:spcBef>
+                <a:spcPts val="100"/>
+              </a:spcBef>
+            </a:pPr>
+            <a:r>
               <a:rPr lang="en-US" sz="1600" dirty="0">
                 <a:cs typeface="Source Sans Pro Light"/>
               </a:rPr>
-              <a:t>This project for TCSS504 is space-themed trivia game, for entertainment purposes only.</a:t>
+              <a:t>This project is a space-themed trivia game, for entertainment purposes only.</a:t>
             </a:r>
           </a:p>
         </p:txBody>
@@ -4494,8 +4518,8 @@
         </p:nvSpPr>
         <p:spPr>
           <a:xfrm>
-            <a:off x="971550" y="3883764"/>
-            <a:ext cx="7085806" cy="1243930"/>
+            <a:off x="971550" y="3502764"/>
+            <a:ext cx="8762206" cy="1515800"/>
           </a:xfrm>
           <a:prstGeom prst="rect">
             <a:avLst/>
@@ -4519,7 +4543,48 @@
               <a:rPr lang="en-US" sz="1600" spc="-10" dirty="0">
                 <a:cs typeface="Source Sans Pro Light"/>
               </a:rPr>
-              <a:t>Player navigates the game board, answering questions as s/he goes.  The player selects the direction s/he wants to move, then must answer the question to continue.  If the question is answered incorrectly, the path closes and the player must choose an alternate direction.  If there is no path to Mars, the player loses the game.  If s/he wins, then they successfully beat Elon to Mars!</a:t>
+              <a:t>Player navigates the game board, answering questions as s/he goes.  The player selects the direction s/he wants to move, then must answer the question to continue.  If the question is answered incorrectly, the path closes and the player must choose an alternate direction.  If there is no path to Mars, the player loses the game. </a:t>
+            </a:r>
+          </a:p>
+          <a:p>
+            <a:pPr marL="12700" marR="5080">
+              <a:lnSpc>
+                <a:spcPct val="100000"/>
+              </a:lnSpc>
+              <a:spcBef>
+                <a:spcPts val="100"/>
+              </a:spcBef>
+            </a:pPr>
+            <a:endParaRPr lang="en-US" sz="1600" spc="-10" dirty="0">
+              <a:cs typeface="Source Sans Pro Light"/>
+            </a:endParaRPr>
+          </a:p>
+          <a:p>
+            <a:pPr marL="12700" marR="5080">
+              <a:lnSpc>
+                <a:spcPct val="100000"/>
+              </a:lnSpc>
+              <a:spcBef>
+                <a:spcPts val="100"/>
+              </a:spcBef>
+            </a:pPr>
+            <a:r>
+              <a:rPr lang="en-US" sz="1600" spc="-10" dirty="0">
+                <a:cs typeface="Source Sans Pro Light"/>
+              </a:rPr>
+              <a:t>Spoiler alert: Mars is -80°F, 95% CO</a:t>
+            </a:r>
+            <a:r>
+              <a:rPr lang="en-US" sz="1600" spc="-10" baseline="30000" dirty="0">
+                <a:cs typeface="Source Sans Pro Light"/>
+              </a:rPr>
+              <a:t>2</a:t>
+            </a:r>
+            <a:r>
+              <a:rPr lang="en-US" sz="1600" spc="-10" dirty="0">
+                <a:cs typeface="Source Sans Pro Light"/>
+              </a:rPr>
+              <a:t>, and radiation levels are 700x that of Earth.  Good luck, Space Cowboy!</a:t>
             </a:r>
             <a:endParaRPr lang="en-US" sz="1600" dirty="0">
               <a:cs typeface="Source Sans Pro Light"/>
@@ -4679,7 +4744,7 @@
         </p:nvSpPr>
         <p:spPr>
           <a:xfrm>
-            <a:off x="665956" y="2948045"/>
+            <a:off x="665956" y="2567045"/>
             <a:ext cx="4806156" cy="443711"/>
           </a:xfrm>
           <a:prstGeom prst="rect">
@@ -5104,7 +5169,7 @@
               <a:rPr lang="en-US" sz="1600" spc="-5" dirty="0">
                 <a:cs typeface="Source Sans Pro Light"/>
               </a:rPr>
-              <a:t>	- Mouse</a:t>
+              <a:t>	- Mouse, keyboard</a:t>
             </a:r>
           </a:p>
           <a:p>
@@ -5156,10 +5221,10 @@
       </p:sp>
       <p:pic>
         <p:nvPicPr>
-          <p:cNvPr id="3" name="Picture 2">
+          <p:cNvPr id="14" name="Picture 13">
             <a:extLst>
               <a:ext uri="{FF2B5EF4-FFF2-40B4-BE49-F238E27FC236}">
-                <a16:creationId xmlns:a16="http://schemas.microsoft.com/office/drawing/2014/main" id="{7F0186C6-A46A-47AB-A565-6C260645E7B9}"/>
+                <a16:creationId xmlns:a16="http://schemas.microsoft.com/office/drawing/2014/main" id="{5E4B0BAE-F22B-48A5-935D-CD30F0151894}"/>
               </a:ext>
             </a:extLst>
           </p:cNvPr>
@@ -5176,8 +5241,8 @@
         </p:blipFill>
         <p:spPr>
           <a:xfrm>
-            <a:off x="10969900" y="785505"/>
-            <a:ext cx="6552460" cy="6779134"/>
+            <a:off x="11093919" y="1460500"/>
+            <a:ext cx="6944844" cy="7404100"/>
           </a:xfrm>
           <a:prstGeom prst="rect">
             <a:avLst/>
@@ -5460,7 +5525,7 @@
               <a:rPr lang="en-US" sz="1600" dirty="0">
                 <a:cs typeface="Source Sans Pro Light"/>
               </a:rPr>
-              <a:t>Console is based on Model Controller View Template</a:t>
+              <a:t>Console dev based on Model Controller View Template</a:t>
             </a:r>
           </a:p>
         </p:txBody>
@@ -6395,10 +6460,10 @@
       </p:grpSpPr>
       <p:pic>
         <p:nvPicPr>
-          <p:cNvPr id="8" name="Picture 7">
+          <p:cNvPr id="3" name="Picture 2">
             <a:extLst>
               <a:ext uri="{FF2B5EF4-FFF2-40B4-BE49-F238E27FC236}">
-                <a16:creationId xmlns:a16="http://schemas.microsoft.com/office/drawing/2014/main" id="{16DFFDFE-6886-4434-8EF5-3B86B34771B3}"/>
+                <a16:creationId xmlns:a16="http://schemas.microsoft.com/office/drawing/2014/main" id="{809A42A2-7E86-4A13-BA37-2EBC1B455A4B}"/>
               </a:ext>
             </a:extLst>
           </p:cNvPr>
@@ -6415,8 +6480,8 @@
         </p:blipFill>
         <p:spPr>
           <a:xfrm>
-            <a:off x="1504156" y="1192156"/>
-            <a:ext cx="15039896" cy="8990916"/>
+            <a:off x="2875756" y="1228590"/>
+            <a:ext cx="13077825" cy="9458325"/>
           </a:xfrm>
           <a:prstGeom prst="rect">
             <a:avLst/>
@@ -6576,7 +6641,7 @@
         </p:nvSpPr>
         <p:spPr>
           <a:xfrm>
-            <a:off x="9711341" y="8738722"/>
+            <a:off x="7092916" y="8775156"/>
             <a:ext cx="2954270" cy="369332"/>
           </a:xfrm>
           <a:prstGeom prst="rect">
@@ -6602,6 +6667,753 @@
                 <a:schemeClr val="bg1"/>
               </a:solidFill>
             </a:endParaRPr>
+          </a:p>
+        </p:txBody>
+      </p:sp>
+      <p:sp>
+        <p:nvSpPr>
+          <p:cNvPr id="9" name="Rectangle 8">
+            <a:extLst>
+              <a:ext uri="{FF2B5EF4-FFF2-40B4-BE49-F238E27FC236}">
+                <a16:creationId xmlns:a16="http://schemas.microsoft.com/office/drawing/2014/main" id="{24596C7C-5A21-430E-A7A2-4DBFDD7EBAA8}"/>
+              </a:ext>
+            </a:extLst>
+          </p:cNvPr>
+          <p:cNvSpPr/>
+          <p:nvPr/>
+        </p:nvSpPr>
+        <p:spPr>
+          <a:xfrm>
+            <a:off x="5742996" y="691993"/>
+            <a:ext cx="228600" cy="192143"/>
+          </a:xfrm>
+          <a:prstGeom prst="rect">
+            <a:avLst/>
+          </a:prstGeom>
+          <a:solidFill>
+            <a:schemeClr val="accent6"/>
+          </a:solidFill>
+          <a:ln>
+            <a:noFill/>
+          </a:ln>
+        </p:spPr>
+        <p:style>
+          <a:lnRef idx="2">
+            <a:schemeClr val="accent1">
+              <a:shade val="50000"/>
+            </a:schemeClr>
+          </a:lnRef>
+          <a:fillRef idx="1">
+            <a:schemeClr val="accent1"/>
+          </a:fillRef>
+          <a:effectRef idx="0">
+            <a:schemeClr val="accent1"/>
+          </a:effectRef>
+          <a:fontRef idx="minor">
+            <a:schemeClr val="lt1"/>
+          </a:fontRef>
+        </p:style>
+        <p:txBody>
+          <a:bodyPr rtlCol="0" anchor="ctr"/>
+          <a:lstStyle/>
+          <a:p>
+            <a:pPr algn="ctr"/>
+            <a:endParaRPr lang="en-US"/>
+          </a:p>
+        </p:txBody>
+      </p:sp>
+      <p:sp>
+        <p:nvSpPr>
+          <p:cNvPr id="10" name="Rectangle 9">
+            <a:extLst>
+              <a:ext uri="{FF2B5EF4-FFF2-40B4-BE49-F238E27FC236}">
+                <a16:creationId xmlns:a16="http://schemas.microsoft.com/office/drawing/2014/main" id="{EB60B694-F509-43B3-B582-5DF1B0162A8C}"/>
+              </a:ext>
+            </a:extLst>
+          </p:cNvPr>
+          <p:cNvSpPr/>
+          <p:nvPr/>
+        </p:nvSpPr>
+        <p:spPr>
+          <a:xfrm>
+            <a:off x="5742996" y="1066981"/>
+            <a:ext cx="228600" cy="192143"/>
+          </a:xfrm>
+          <a:prstGeom prst="rect">
+            <a:avLst/>
+          </a:prstGeom>
+          <a:solidFill>
+            <a:srgbClr val="FFC000"/>
+          </a:solidFill>
+          <a:ln>
+            <a:noFill/>
+          </a:ln>
+        </p:spPr>
+        <p:style>
+          <a:lnRef idx="2">
+            <a:schemeClr val="accent1">
+              <a:shade val="50000"/>
+            </a:schemeClr>
+          </a:lnRef>
+          <a:fillRef idx="1">
+            <a:schemeClr val="accent1"/>
+          </a:fillRef>
+          <a:effectRef idx="0">
+            <a:schemeClr val="accent1"/>
+          </a:effectRef>
+          <a:fontRef idx="minor">
+            <a:schemeClr val="lt1"/>
+          </a:fontRef>
+        </p:style>
+        <p:txBody>
+          <a:bodyPr rtlCol="0" anchor="ctr"/>
+          <a:lstStyle/>
+          <a:p>
+            <a:pPr algn="ctr"/>
+            <a:endParaRPr lang="en-US"/>
+          </a:p>
+        </p:txBody>
+      </p:sp>
+      <p:sp>
+        <p:nvSpPr>
+          <p:cNvPr id="11" name="TextBox 10">
+            <a:extLst>
+              <a:ext uri="{FF2B5EF4-FFF2-40B4-BE49-F238E27FC236}">
+                <a16:creationId xmlns:a16="http://schemas.microsoft.com/office/drawing/2014/main" id="{4FB2CB10-7DE1-44C5-B746-03D4523F2F45}"/>
+              </a:ext>
+            </a:extLst>
+          </p:cNvPr>
+          <p:cNvSpPr txBox="1"/>
+          <p:nvPr/>
+        </p:nvSpPr>
+        <p:spPr>
+          <a:xfrm>
+            <a:off x="5971596" y="618787"/>
+            <a:ext cx="603050" cy="338554"/>
+          </a:xfrm>
+          <a:prstGeom prst="rect">
+            <a:avLst/>
+          </a:prstGeom>
+          <a:noFill/>
+        </p:spPr>
+        <p:txBody>
+          <a:bodyPr wrap="none" rtlCol="0">
+            <a:spAutoFit/>
+          </a:bodyPr>
+          <a:lstStyle/>
+          <a:p>
+            <a:r>
+              <a:rPr lang="en-US" sz="1600" dirty="0" err="1"/>
+              <a:t>Sriba</a:t>
+            </a:r>
+            <a:endParaRPr lang="en-US" sz="1600" dirty="0"/>
+          </a:p>
+        </p:txBody>
+      </p:sp>
+      <p:sp>
+        <p:nvSpPr>
+          <p:cNvPr id="12" name="TextBox 11">
+            <a:extLst>
+              <a:ext uri="{FF2B5EF4-FFF2-40B4-BE49-F238E27FC236}">
+                <a16:creationId xmlns:a16="http://schemas.microsoft.com/office/drawing/2014/main" id="{DCB77866-2F2F-4CB5-B9F7-9146C2B314C8}"/>
+              </a:ext>
+            </a:extLst>
+          </p:cNvPr>
+          <p:cNvSpPr txBox="1"/>
+          <p:nvPr/>
+        </p:nvSpPr>
+        <p:spPr>
+          <a:xfrm>
+            <a:off x="5971596" y="993775"/>
+            <a:ext cx="474232" cy="338554"/>
+          </a:xfrm>
+          <a:prstGeom prst="rect">
+            <a:avLst/>
+          </a:prstGeom>
+          <a:noFill/>
+        </p:spPr>
+        <p:txBody>
+          <a:bodyPr wrap="none" rtlCol="0">
+            <a:spAutoFit/>
+          </a:bodyPr>
+          <a:lstStyle/>
+          <a:p>
+            <a:r>
+              <a:rPr lang="en-US" sz="1600" dirty="0"/>
+              <a:t>Jeff</a:t>
+            </a:r>
+          </a:p>
+        </p:txBody>
+      </p:sp>
+      <p:sp>
+        <p:nvSpPr>
+          <p:cNvPr id="13" name="Rectangle 12">
+            <a:extLst>
+              <a:ext uri="{FF2B5EF4-FFF2-40B4-BE49-F238E27FC236}">
+                <a16:creationId xmlns:a16="http://schemas.microsoft.com/office/drawing/2014/main" id="{37AC96C4-772B-411C-AAC9-BAE81DD86B6D}"/>
+              </a:ext>
+            </a:extLst>
+          </p:cNvPr>
+          <p:cNvSpPr/>
+          <p:nvPr/>
+        </p:nvSpPr>
+        <p:spPr>
+          <a:xfrm>
+            <a:off x="3644055" y="1804782"/>
+            <a:ext cx="228600" cy="192143"/>
+          </a:xfrm>
+          <a:prstGeom prst="rect">
+            <a:avLst/>
+          </a:prstGeom>
+          <a:solidFill>
+            <a:schemeClr val="accent6"/>
+          </a:solidFill>
+          <a:ln>
+            <a:noFill/>
+          </a:ln>
+        </p:spPr>
+        <p:style>
+          <a:lnRef idx="2">
+            <a:schemeClr val="accent1">
+              <a:shade val="50000"/>
+            </a:schemeClr>
+          </a:lnRef>
+          <a:fillRef idx="1">
+            <a:schemeClr val="accent1"/>
+          </a:fillRef>
+          <a:effectRef idx="0">
+            <a:schemeClr val="accent1"/>
+          </a:effectRef>
+          <a:fontRef idx="minor">
+            <a:schemeClr val="lt1"/>
+          </a:fontRef>
+        </p:style>
+        <p:txBody>
+          <a:bodyPr rtlCol="0" anchor="ctr"/>
+          <a:lstStyle/>
+          <a:p>
+            <a:pPr algn="ctr"/>
+            <a:endParaRPr lang="en-US"/>
+          </a:p>
+        </p:txBody>
+      </p:sp>
+      <p:sp>
+        <p:nvSpPr>
+          <p:cNvPr id="14" name="Rectangle 13">
+            <a:extLst>
+              <a:ext uri="{FF2B5EF4-FFF2-40B4-BE49-F238E27FC236}">
+                <a16:creationId xmlns:a16="http://schemas.microsoft.com/office/drawing/2014/main" id="{9A5F344A-FF77-41DA-B340-FC997A8A2C7C}"/>
+              </a:ext>
+            </a:extLst>
+          </p:cNvPr>
+          <p:cNvSpPr/>
+          <p:nvPr/>
+        </p:nvSpPr>
+        <p:spPr>
+          <a:xfrm>
+            <a:off x="6830520" y="2142991"/>
+            <a:ext cx="228600" cy="192143"/>
+          </a:xfrm>
+          <a:prstGeom prst="rect">
+            <a:avLst/>
+          </a:prstGeom>
+          <a:solidFill>
+            <a:schemeClr val="accent6"/>
+          </a:solidFill>
+          <a:ln>
+            <a:noFill/>
+          </a:ln>
+        </p:spPr>
+        <p:style>
+          <a:lnRef idx="2">
+            <a:schemeClr val="accent1">
+              <a:shade val="50000"/>
+            </a:schemeClr>
+          </a:lnRef>
+          <a:fillRef idx="1">
+            <a:schemeClr val="accent1"/>
+          </a:fillRef>
+          <a:effectRef idx="0">
+            <a:schemeClr val="accent1"/>
+          </a:effectRef>
+          <a:fontRef idx="minor">
+            <a:schemeClr val="lt1"/>
+          </a:fontRef>
+        </p:style>
+        <p:txBody>
+          <a:bodyPr rtlCol="0" anchor="ctr"/>
+          <a:lstStyle/>
+          <a:p>
+            <a:pPr algn="ctr"/>
+            <a:endParaRPr lang="en-US"/>
+          </a:p>
+        </p:txBody>
+      </p:sp>
+      <p:sp>
+        <p:nvSpPr>
+          <p:cNvPr id="15" name="Rectangle 14">
+            <a:extLst>
+              <a:ext uri="{FF2B5EF4-FFF2-40B4-BE49-F238E27FC236}">
+                <a16:creationId xmlns:a16="http://schemas.microsoft.com/office/drawing/2014/main" id="{6274198C-C821-4434-A19C-8EF9CA2348A3}"/>
+              </a:ext>
+            </a:extLst>
+          </p:cNvPr>
+          <p:cNvSpPr/>
+          <p:nvPr/>
+        </p:nvSpPr>
+        <p:spPr>
+          <a:xfrm>
+            <a:off x="3811852" y="3020934"/>
+            <a:ext cx="228600" cy="192143"/>
+          </a:xfrm>
+          <a:prstGeom prst="rect">
+            <a:avLst/>
+          </a:prstGeom>
+          <a:solidFill>
+            <a:schemeClr val="accent6"/>
+          </a:solidFill>
+          <a:ln>
+            <a:noFill/>
+          </a:ln>
+        </p:spPr>
+        <p:style>
+          <a:lnRef idx="2">
+            <a:schemeClr val="accent1">
+              <a:shade val="50000"/>
+            </a:schemeClr>
+          </a:lnRef>
+          <a:fillRef idx="1">
+            <a:schemeClr val="accent1"/>
+          </a:fillRef>
+          <a:effectRef idx="0">
+            <a:schemeClr val="accent1"/>
+          </a:effectRef>
+          <a:fontRef idx="minor">
+            <a:schemeClr val="lt1"/>
+          </a:fontRef>
+        </p:style>
+        <p:txBody>
+          <a:bodyPr rtlCol="0" anchor="ctr"/>
+          <a:lstStyle/>
+          <a:p>
+            <a:pPr algn="ctr"/>
+            <a:endParaRPr lang="en-US"/>
+          </a:p>
+        </p:txBody>
+      </p:sp>
+      <p:sp>
+        <p:nvSpPr>
+          <p:cNvPr id="16" name="Rectangle 15">
+            <a:extLst>
+              <a:ext uri="{FF2B5EF4-FFF2-40B4-BE49-F238E27FC236}">
+                <a16:creationId xmlns:a16="http://schemas.microsoft.com/office/drawing/2014/main" id="{F8672C68-2C29-4221-A3D4-116B0B9A98A8}"/>
+              </a:ext>
+            </a:extLst>
+          </p:cNvPr>
+          <p:cNvSpPr/>
+          <p:nvPr/>
+        </p:nvSpPr>
+        <p:spPr>
+          <a:xfrm>
+            <a:off x="10620531" y="1612174"/>
+            <a:ext cx="228600" cy="192143"/>
+          </a:xfrm>
+          <a:prstGeom prst="rect">
+            <a:avLst/>
+          </a:prstGeom>
+          <a:solidFill>
+            <a:schemeClr val="accent6"/>
+          </a:solidFill>
+          <a:ln>
+            <a:noFill/>
+          </a:ln>
+        </p:spPr>
+        <p:style>
+          <a:lnRef idx="2">
+            <a:schemeClr val="accent1">
+              <a:shade val="50000"/>
+            </a:schemeClr>
+          </a:lnRef>
+          <a:fillRef idx="1">
+            <a:schemeClr val="accent1"/>
+          </a:fillRef>
+          <a:effectRef idx="0">
+            <a:schemeClr val="accent1"/>
+          </a:effectRef>
+          <a:fontRef idx="minor">
+            <a:schemeClr val="lt1"/>
+          </a:fontRef>
+        </p:style>
+        <p:txBody>
+          <a:bodyPr rtlCol="0" anchor="ctr"/>
+          <a:lstStyle/>
+          <a:p>
+            <a:pPr algn="ctr"/>
+            <a:endParaRPr lang="en-US"/>
+          </a:p>
+        </p:txBody>
+      </p:sp>
+      <p:sp>
+        <p:nvSpPr>
+          <p:cNvPr id="19" name="Rectangle 18">
+            <a:extLst>
+              <a:ext uri="{FF2B5EF4-FFF2-40B4-BE49-F238E27FC236}">
+                <a16:creationId xmlns:a16="http://schemas.microsoft.com/office/drawing/2014/main" id="{BCAAC8E2-3A55-48EE-99AE-C4F292046149}"/>
+              </a:ext>
+            </a:extLst>
+          </p:cNvPr>
+          <p:cNvSpPr/>
+          <p:nvPr/>
+        </p:nvSpPr>
+        <p:spPr>
+          <a:xfrm>
+            <a:off x="13439931" y="4047991"/>
+            <a:ext cx="228600" cy="192143"/>
+          </a:xfrm>
+          <a:prstGeom prst="rect">
+            <a:avLst/>
+          </a:prstGeom>
+          <a:solidFill>
+            <a:schemeClr val="accent6"/>
+          </a:solidFill>
+          <a:ln>
+            <a:noFill/>
+          </a:ln>
+        </p:spPr>
+        <p:style>
+          <a:lnRef idx="2">
+            <a:schemeClr val="accent1">
+              <a:shade val="50000"/>
+            </a:schemeClr>
+          </a:lnRef>
+          <a:fillRef idx="1">
+            <a:schemeClr val="accent1"/>
+          </a:fillRef>
+          <a:effectRef idx="0">
+            <a:schemeClr val="accent1"/>
+          </a:effectRef>
+          <a:fontRef idx="minor">
+            <a:schemeClr val="lt1"/>
+          </a:fontRef>
+        </p:style>
+        <p:txBody>
+          <a:bodyPr rtlCol="0" anchor="ctr"/>
+          <a:lstStyle/>
+          <a:p>
+            <a:pPr algn="ctr"/>
+            <a:endParaRPr lang="en-US"/>
+          </a:p>
+        </p:txBody>
+      </p:sp>
+      <p:sp>
+        <p:nvSpPr>
+          <p:cNvPr id="20" name="Rectangle 19">
+            <a:extLst>
+              <a:ext uri="{FF2B5EF4-FFF2-40B4-BE49-F238E27FC236}">
+                <a16:creationId xmlns:a16="http://schemas.microsoft.com/office/drawing/2014/main" id="{0291E43B-279A-4C90-8165-3AD91834B423}"/>
+              </a:ext>
+            </a:extLst>
+          </p:cNvPr>
+          <p:cNvSpPr/>
+          <p:nvPr/>
+        </p:nvSpPr>
+        <p:spPr>
+          <a:xfrm>
+            <a:off x="13554231" y="6678534"/>
+            <a:ext cx="228600" cy="192143"/>
+          </a:xfrm>
+          <a:prstGeom prst="rect">
+            <a:avLst/>
+          </a:prstGeom>
+          <a:solidFill>
+            <a:schemeClr val="accent6"/>
+          </a:solidFill>
+          <a:ln>
+            <a:noFill/>
+          </a:ln>
+        </p:spPr>
+        <p:style>
+          <a:lnRef idx="2">
+            <a:schemeClr val="accent1">
+              <a:shade val="50000"/>
+            </a:schemeClr>
+          </a:lnRef>
+          <a:fillRef idx="1">
+            <a:schemeClr val="accent1"/>
+          </a:fillRef>
+          <a:effectRef idx="0">
+            <a:schemeClr val="accent1"/>
+          </a:effectRef>
+          <a:fontRef idx="minor">
+            <a:schemeClr val="lt1"/>
+          </a:fontRef>
+        </p:style>
+        <p:txBody>
+          <a:bodyPr rtlCol="0" anchor="ctr"/>
+          <a:lstStyle/>
+          <a:p>
+            <a:pPr algn="ctr"/>
+            <a:endParaRPr lang="en-US"/>
+          </a:p>
+        </p:txBody>
+      </p:sp>
+      <p:sp>
+        <p:nvSpPr>
+          <p:cNvPr id="21" name="Rectangle 20">
+            <a:extLst>
+              <a:ext uri="{FF2B5EF4-FFF2-40B4-BE49-F238E27FC236}">
+                <a16:creationId xmlns:a16="http://schemas.microsoft.com/office/drawing/2014/main" id="{2E25A8A2-DB2B-4F17-A0A5-892D7D3578C2}"/>
+              </a:ext>
+            </a:extLst>
+          </p:cNvPr>
+          <p:cNvSpPr/>
+          <p:nvPr/>
+        </p:nvSpPr>
+        <p:spPr>
+          <a:xfrm>
+            <a:off x="10620531" y="4047990"/>
+            <a:ext cx="228600" cy="192143"/>
+          </a:xfrm>
+          <a:prstGeom prst="rect">
+            <a:avLst/>
+          </a:prstGeom>
+          <a:solidFill>
+            <a:schemeClr val="accent6"/>
+          </a:solidFill>
+          <a:ln>
+            <a:noFill/>
+          </a:ln>
+        </p:spPr>
+        <p:style>
+          <a:lnRef idx="2">
+            <a:schemeClr val="accent1">
+              <a:shade val="50000"/>
+            </a:schemeClr>
+          </a:lnRef>
+          <a:fillRef idx="1">
+            <a:schemeClr val="accent1"/>
+          </a:fillRef>
+          <a:effectRef idx="0">
+            <a:schemeClr val="accent1"/>
+          </a:effectRef>
+          <a:fontRef idx="minor">
+            <a:schemeClr val="lt1"/>
+          </a:fontRef>
+        </p:style>
+        <p:txBody>
+          <a:bodyPr rtlCol="0" anchor="ctr"/>
+          <a:lstStyle/>
+          <a:p>
+            <a:pPr algn="ctr"/>
+            <a:endParaRPr lang="en-US"/>
+          </a:p>
+        </p:txBody>
+      </p:sp>
+      <p:sp>
+        <p:nvSpPr>
+          <p:cNvPr id="22" name="Rectangle 21">
+            <a:extLst>
+              <a:ext uri="{FF2B5EF4-FFF2-40B4-BE49-F238E27FC236}">
+                <a16:creationId xmlns:a16="http://schemas.microsoft.com/office/drawing/2014/main" id="{6B418DC8-3F19-4C5E-A38E-570DB73657C5}"/>
+              </a:ext>
+            </a:extLst>
+          </p:cNvPr>
+          <p:cNvSpPr/>
+          <p:nvPr/>
+        </p:nvSpPr>
+        <p:spPr>
+          <a:xfrm>
+            <a:off x="6847236" y="4047989"/>
+            <a:ext cx="228600" cy="192143"/>
+          </a:xfrm>
+          <a:prstGeom prst="rect">
+            <a:avLst/>
+          </a:prstGeom>
+          <a:solidFill>
+            <a:schemeClr val="accent6"/>
+          </a:solidFill>
+          <a:ln>
+            <a:noFill/>
+          </a:ln>
+        </p:spPr>
+        <p:style>
+          <a:lnRef idx="2">
+            <a:schemeClr val="accent1">
+              <a:shade val="50000"/>
+            </a:schemeClr>
+          </a:lnRef>
+          <a:fillRef idx="1">
+            <a:schemeClr val="accent1"/>
+          </a:fillRef>
+          <a:effectRef idx="0">
+            <a:schemeClr val="accent1"/>
+          </a:effectRef>
+          <a:fontRef idx="minor">
+            <a:schemeClr val="lt1"/>
+          </a:fontRef>
+        </p:style>
+        <p:txBody>
+          <a:bodyPr rtlCol="0" anchor="ctr"/>
+          <a:lstStyle/>
+          <a:p>
+            <a:pPr algn="ctr"/>
+            <a:endParaRPr lang="en-US"/>
+          </a:p>
+        </p:txBody>
+      </p:sp>
+      <p:sp>
+        <p:nvSpPr>
+          <p:cNvPr id="23" name="Rectangle 22">
+            <a:extLst>
+              <a:ext uri="{FF2B5EF4-FFF2-40B4-BE49-F238E27FC236}">
+                <a16:creationId xmlns:a16="http://schemas.microsoft.com/office/drawing/2014/main" id="{E9CD6880-30E5-4066-A254-14D38B06F023}"/>
+              </a:ext>
+            </a:extLst>
+          </p:cNvPr>
+          <p:cNvSpPr/>
+          <p:nvPr/>
+        </p:nvSpPr>
+        <p:spPr>
+          <a:xfrm>
+            <a:off x="3855399" y="4087734"/>
+            <a:ext cx="228600" cy="192143"/>
+          </a:xfrm>
+          <a:prstGeom prst="rect">
+            <a:avLst/>
+          </a:prstGeom>
+          <a:solidFill>
+            <a:srgbClr val="FFC000"/>
+          </a:solidFill>
+          <a:ln>
+            <a:noFill/>
+          </a:ln>
+        </p:spPr>
+        <p:style>
+          <a:lnRef idx="2">
+            <a:schemeClr val="accent1">
+              <a:shade val="50000"/>
+            </a:schemeClr>
+          </a:lnRef>
+          <a:fillRef idx="1">
+            <a:schemeClr val="accent1"/>
+          </a:fillRef>
+          <a:effectRef idx="0">
+            <a:schemeClr val="accent1"/>
+          </a:effectRef>
+          <a:fontRef idx="minor">
+            <a:schemeClr val="lt1"/>
+          </a:fontRef>
+        </p:style>
+        <p:txBody>
+          <a:bodyPr rtlCol="0" anchor="ctr"/>
+          <a:lstStyle/>
+          <a:p>
+            <a:pPr algn="ctr"/>
+            <a:endParaRPr lang="en-US"/>
+          </a:p>
+        </p:txBody>
+      </p:sp>
+      <p:sp>
+        <p:nvSpPr>
+          <p:cNvPr id="24" name="Rectangle 23">
+            <a:extLst>
+              <a:ext uri="{FF2B5EF4-FFF2-40B4-BE49-F238E27FC236}">
+                <a16:creationId xmlns:a16="http://schemas.microsoft.com/office/drawing/2014/main" id="{0D64843B-49DA-41F0-978A-1D1DBF4FF467}"/>
+              </a:ext>
+            </a:extLst>
+          </p:cNvPr>
+          <p:cNvSpPr/>
+          <p:nvPr/>
+        </p:nvSpPr>
+        <p:spPr>
+          <a:xfrm>
+            <a:off x="6560499" y="4047989"/>
+            <a:ext cx="228600" cy="192143"/>
+          </a:xfrm>
+          <a:prstGeom prst="rect">
+            <a:avLst/>
+          </a:prstGeom>
+          <a:solidFill>
+            <a:srgbClr val="FFC000"/>
+          </a:solidFill>
+          <a:ln>
+            <a:noFill/>
+          </a:ln>
+        </p:spPr>
+        <p:style>
+          <a:lnRef idx="2">
+            <a:schemeClr val="accent1">
+              <a:shade val="50000"/>
+            </a:schemeClr>
+          </a:lnRef>
+          <a:fillRef idx="1">
+            <a:schemeClr val="accent1"/>
+          </a:fillRef>
+          <a:effectRef idx="0">
+            <a:schemeClr val="accent1"/>
+          </a:effectRef>
+          <a:fontRef idx="minor">
+            <a:schemeClr val="lt1"/>
+          </a:fontRef>
+        </p:style>
+        <p:txBody>
+          <a:bodyPr rtlCol="0" anchor="ctr"/>
+          <a:lstStyle/>
+          <a:p>
+            <a:pPr algn="ctr"/>
+            <a:endParaRPr lang="en-US"/>
+          </a:p>
+        </p:txBody>
+      </p:sp>
+      <p:sp>
+        <p:nvSpPr>
+          <p:cNvPr id="25" name="Rectangle 24">
+            <a:extLst>
+              <a:ext uri="{FF2B5EF4-FFF2-40B4-BE49-F238E27FC236}">
+                <a16:creationId xmlns:a16="http://schemas.microsoft.com/office/drawing/2014/main" id="{4B0BAF82-2847-45E5-8230-7E4CF0437A13}"/>
+              </a:ext>
+            </a:extLst>
+          </p:cNvPr>
+          <p:cNvSpPr/>
+          <p:nvPr/>
+        </p:nvSpPr>
+        <p:spPr>
+          <a:xfrm>
+            <a:off x="10333794" y="4047989"/>
+            <a:ext cx="228600" cy="192143"/>
+          </a:xfrm>
+          <a:prstGeom prst="rect">
+            <a:avLst/>
+          </a:prstGeom>
+          <a:solidFill>
+            <a:srgbClr val="FFC000"/>
+          </a:solidFill>
+          <a:ln>
+            <a:noFill/>
+          </a:ln>
+        </p:spPr>
+        <p:style>
+          <a:lnRef idx="2">
+            <a:schemeClr val="accent1">
+              <a:shade val="50000"/>
+            </a:schemeClr>
+          </a:lnRef>
+          <a:fillRef idx="1">
+            <a:schemeClr val="accent1"/>
+          </a:fillRef>
+          <a:effectRef idx="0">
+            <a:schemeClr val="accent1"/>
+          </a:effectRef>
+          <a:fontRef idx="minor">
+            <a:schemeClr val="lt1"/>
+          </a:fontRef>
+        </p:style>
+        <p:txBody>
+          <a:bodyPr rtlCol="0" anchor="ctr"/>
+          <a:lstStyle/>
+          <a:p>
+            <a:pPr algn="ctr"/>
+            <a:endParaRPr lang="en-US"/>
           </a:p>
         </p:txBody>
       </p:sp>
@@ -7218,10 +8030,10 @@
       </p:sp>
       <p:pic>
         <p:nvPicPr>
-          <p:cNvPr id="9" name="Picture 8">
+          <p:cNvPr id="7" name="Picture 6">
             <a:extLst>
               <a:ext uri="{FF2B5EF4-FFF2-40B4-BE49-F238E27FC236}">
-                <a16:creationId xmlns:a16="http://schemas.microsoft.com/office/drawing/2014/main" id="{935A4372-BC60-4304-9FF3-50F551EFE4A3}"/>
+                <a16:creationId xmlns:a16="http://schemas.microsoft.com/office/drawing/2014/main" id="{F0165232-4BDC-4065-AC8E-440C7B1E2DEB}"/>
               </a:ext>
             </a:extLst>
           </p:cNvPr>
@@ -7238,8 +8050,8 @@
         </p:blipFill>
         <p:spPr>
           <a:xfrm>
-            <a:off x="682898" y="7316056"/>
-            <a:ext cx="15001875" cy="2628900"/>
+            <a:off x="2037556" y="2222500"/>
+            <a:ext cx="10210800" cy="3800475"/>
           </a:xfrm>
           <a:prstGeom prst="rect">
             <a:avLst/>
@@ -7248,10 +8060,10 @@
       </p:pic>
       <p:pic>
         <p:nvPicPr>
-          <p:cNvPr id="11" name="Picture 10">
+          <p:cNvPr id="10" name="Picture 9">
             <a:extLst>
               <a:ext uri="{FF2B5EF4-FFF2-40B4-BE49-F238E27FC236}">
-                <a16:creationId xmlns:a16="http://schemas.microsoft.com/office/drawing/2014/main" id="{CCB29D3B-2E2A-47AD-BE4D-80C807966CCC}"/>
+                <a16:creationId xmlns:a16="http://schemas.microsoft.com/office/drawing/2014/main" id="{E7EAB40C-64C3-4A7E-BB25-C451E506C382}"/>
               </a:ext>
             </a:extLst>
           </p:cNvPr>
@@ -7268,8 +8080,8 @@
         </p:blipFill>
         <p:spPr>
           <a:xfrm>
-            <a:off x="1630325" y="2755900"/>
-            <a:ext cx="10010775" cy="3609975"/>
+            <a:off x="13200296" y="2289174"/>
+            <a:ext cx="3276600" cy="3667125"/>
           </a:xfrm>
           <a:prstGeom prst="rect">
             <a:avLst/>
@@ -7278,10 +8090,10 @@
       </p:pic>
       <p:pic>
         <p:nvPicPr>
-          <p:cNvPr id="13" name="Picture 12">
+          <p:cNvPr id="14" name="Picture 13">
             <a:extLst>
               <a:ext uri="{FF2B5EF4-FFF2-40B4-BE49-F238E27FC236}">
-                <a16:creationId xmlns:a16="http://schemas.microsoft.com/office/drawing/2014/main" id="{41A1911A-3197-4D88-BE0F-D74FA02D11A1}"/>
+                <a16:creationId xmlns:a16="http://schemas.microsoft.com/office/drawing/2014/main" id="{ADD53DD9-3163-4A56-A763-1BEE54B743BB}"/>
               </a:ext>
             </a:extLst>
           </p:cNvPr>
@@ -7298,8 +8110,8 @@
         </p:blipFill>
         <p:spPr>
           <a:xfrm>
-            <a:off x="12934156" y="3426830"/>
-            <a:ext cx="3371850" cy="2695575"/>
+            <a:off x="1899371" y="6413500"/>
+            <a:ext cx="6781800" cy="2724150"/>
           </a:xfrm>
           <a:prstGeom prst="rect">
             <a:avLst/>
@@ -7338,10 +8150,10 @@
       </p:grpSpPr>
       <p:grpSp>
         <p:nvGrpSpPr>
-          <p:cNvPr id="2" name="Group 1">
+          <p:cNvPr id="17" name="Group 16">
             <a:extLst>
               <a:ext uri="{FF2B5EF4-FFF2-40B4-BE49-F238E27FC236}">
-                <a16:creationId xmlns:a16="http://schemas.microsoft.com/office/drawing/2014/main" id="{8F67EE21-FE19-48F6-AD3D-0D39258E86A1}"/>
+                <a16:creationId xmlns:a16="http://schemas.microsoft.com/office/drawing/2014/main" id="{FE9399BB-AC25-476B-BE18-B55A8A7219B4}"/>
               </a:ext>
             </a:extLst>
           </p:cNvPr>
@@ -7350,351 +8162,8 @@
         </p:nvGrpSpPr>
         <p:grpSpPr>
           <a:xfrm>
-            <a:off x="1" y="1242099"/>
-            <a:ext cx="8743155" cy="828001"/>
-            <a:chOff x="1" y="469899"/>
-            <a:chExt cx="8743155" cy="828001"/>
-          </a:xfrm>
-        </p:grpSpPr>
-        <p:sp>
-          <p:nvSpPr>
-            <p:cNvPr id="3" name="object 2">
-              <a:extLst>
-                <a:ext uri="{FF2B5EF4-FFF2-40B4-BE49-F238E27FC236}">
-                  <a16:creationId xmlns:a16="http://schemas.microsoft.com/office/drawing/2014/main" id="{BE658852-196B-4B6A-A5E9-70F1EB1CD465}"/>
-                </a:ext>
-              </a:extLst>
-            </p:cNvPr>
-            <p:cNvSpPr/>
-            <p:nvPr/>
-          </p:nvSpPr>
-          <p:spPr>
-            <a:xfrm>
-              <a:off x="1" y="469900"/>
-              <a:ext cx="5542756" cy="828000"/>
-            </a:xfrm>
-            <a:custGeom>
-              <a:avLst/>
-              <a:gdLst/>
-              <a:ahLst/>
-              <a:cxnLst/>
-              <a:rect l="l" t="t" r="r" b="b"/>
-              <a:pathLst>
-                <a:path w="2389505" h="437514">
-                  <a:moveTo>
-                    <a:pt x="2170722" y="0"/>
-                  </a:moveTo>
-                  <a:lnTo>
-                    <a:pt x="0" y="0"/>
-                  </a:lnTo>
-                  <a:lnTo>
-                    <a:pt x="0" y="437153"/>
-                  </a:lnTo>
-                  <a:lnTo>
-                    <a:pt x="2170722" y="437153"/>
-                  </a:lnTo>
-                  <a:lnTo>
-                    <a:pt x="2220839" y="431380"/>
-                  </a:lnTo>
-                  <a:lnTo>
-                    <a:pt x="2266846" y="414936"/>
-                  </a:lnTo>
-                  <a:lnTo>
-                    <a:pt x="2307430" y="389134"/>
-                  </a:lnTo>
-                  <a:lnTo>
-                    <a:pt x="2341280" y="355285"/>
-                  </a:lnTo>
-                  <a:lnTo>
-                    <a:pt x="2367082" y="314701"/>
-                  </a:lnTo>
-                  <a:lnTo>
-                    <a:pt x="2383526" y="268694"/>
-                  </a:lnTo>
-                  <a:lnTo>
-                    <a:pt x="2389299" y="218577"/>
-                  </a:lnTo>
-                  <a:lnTo>
-                    <a:pt x="2383526" y="168459"/>
-                  </a:lnTo>
-                  <a:lnTo>
-                    <a:pt x="2367082" y="122452"/>
-                  </a:lnTo>
-                  <a:lnTo>
-                    <a:pt x="2341280" y="81868"/>
-                  </a:lnTo>
-                  <a:lnTo>
-                    <a:pt x="2307430" y="48018"/>
-                  </a:lnTo>
-                  <a:lnTo>
-                    <a:pt x="2266846" y="22216"/>
-                  </a:lnTo>
-                  <a:lnTo>
-                    <a:pt x="2220839" y="5772"/>
-                  </a:lnTo>
-                  <a:lnTo>
-                    <a:pt x="2170722" y="0"/>
-                  </a:lnTo>
-                  <a:close/>
-                </a:path>
-              </a:pathLst>
-            </a:custGeom>
-            <a:solidFill>
-              <a:srgbClr val="00A0F0"/>
-            </a:solidFill>
-          </p:spPr>
-          <p:txBody>
-            <a:bodyPr wrap="square" lIns="0" tIns="0" rIns="0" bIns="0" rtlCol="0"/>
-            <a:lstStyle/>
-            <a:p>
-              <a:endParaRPr/>
-            </a:p>
-          </p:txBody>
-        </p:sp>
-        <p:sp>
-          <p:nvSpPr>
-            <p:cNvPr id="4" name="object 2">
-              <a:extLst>
-                <a:ext uri="{FF2B5EF4-FFF2-40B4-BE49-F238E27FC236}">
-                  <a16:creationId xmlns:a16="http://schemas.microsoft.com/office/drawing/2014/main" id="{8F24A54F-4A01-4F06-B827-368A77CD755A}"/>
-                </a:ext>
-              </a:extLst>
-            </p:cNvPr>
-            <p:cNvSpPr/>
-            <p:nvPr/>
-          </p:nvSpPr>
-          <p:spPr>
-            <a:xfrm>
-              <a:off x="4528271" y="469899"/>
-              <a:ext cx="4214885" cy="828000"/>
-            </a:xfrm>
-            <a:custGeom>
-              <a:avLst/>
-              <a:gdLst/>
-              <a:ahLst/>
-              <a:cxnLst/>
-              <a:rect l="l" t="t" r="r" b="b"/>
-              <a:pathLst>
-                <a:path w="2389505" h="437514">
-                  <a:moveTo>
-                    <a:pt x="2170722" y="0"/>
-                  </a:moveTo>
-                  <a:lnTo>
-                    <a:pt x="0" y="0"/>
-                  </a:lnTo>
-                  <a:lnTo>
-                    <a:pt x="0" y="437153"/>
-                  </a:lnTo>
-                  <a:lnTo>
-                    <a:pt x="2170722" y="437153"/>
-                  </a:lnTo>
-                  <a:lnTo>
-                    <a:pt x="2220839" y="431380"/>
-                  </a:lnTo>
-                  <a:lnTo>
-                    <a:pt x="2266846" y="414936"/>
-                  </a:lnTo>
-                  <a:lnTo>
-                    <a:pt x="2307430" y="389134"/>
-                  </a:lnTo>
-                  <a:lnTo>
-                    <a:pt x="2341280" y="355285"/>
-                  </a:lnTo>
-                  <a:lnTo>
-                    <a:pt x="2367082" y="314701"/>
-                  </a:lnTo>
-                  <a:lnTo>
-                    <a:pt x="2383526" y="268694"/>
-                  </a:lnTo>
-                  <a:lnTo>
-                    <a:pt x="2389299" y="218577"/>
-                  </a:lnTo>
-                  <a:lnTo>
-                    <a:pt x="2383526" y="168459"/>
-                  </a:lnTo>
-                  <a:lnTo>
-                    <a:pt x="2367082" y="122452"/>
-                  </a:lnTo>
-                  <a:lnTo>
-                    <a:pt x="2341280" y="81868"/>
-                  </a:lnTo>
-                  <a:lnTo>
-                    <a:pt x="2307430" y="48018"/>
-                  </a:lnTo>
-                  <a:lnTo>
-                    <a:pt x="2266846" y="22216"/>
-                  </a:lnTo>
-                  <a:lnTo>
-                    <a:pt x="2220839" y="5772"/>
-                  </a:lnTo>
-                  <a:lnTo>
-                    <a:pt x="2170722" y="0"/>
-                  </a:lnTo>
-                  <a:close/>
-                </a:path>
-              </a:pathLst>
-            </a:custGeom>
-            <a:solidFill>
-              <a:srgbClr val="00A0F0"/>
-            </a:solidFill>
-          </p:spPr>
-          <p:txBody>
-            <a:bodyPr wrap="square" lIns="0" tIns="0" rIns="0" bIns="0" rtlCol="0"/>
-            <a:lstStyle/>
-            <a:p>
-              <a:endParaRPr/>
-            </a:p>
-          </p:txBody>
-        </p:sp>
-      </p:grpSp>
-      <p:sp>
-        <p:nvSpPr>
-          <p:cNvPr id="5" name="object 4">
-            <a:extLst>
-              <a:ext uri="{FF2B5EF4-FFF2-40B4-BE49-F238E27FC236}">
-                <a16:creationId xmlns:a16="http://schemas.microsoft.com/office/drawing/2014/main" id="{8E517B89-6564-4443-A785-2B1B6912B7DC}"/>
-              </a:ext>
-            </a:extLst>
-          </p:cNvPr>
-          <p:cNvSpPr txBox="1"/>
-          <p:nvPr/>
-        </p:nvSpPr>
-        <p:spPr>
-          <a:xfrm>
-            <a:off x="665956" y="1434244"/>
-            <a:ext cx="9601200" cy="443711"/>
-          </a:xfrm>
-          <a:prstGeom prst="rect">
-            <a:avLst/>
-          </a:prstGeom>
-        </p:spPr>
-        <p:txBody>
-          <a:bodyPr vert="horz" wrap="square" lIns="0" tIns="12700" rIns="0" bIns="0" rtlCol="0">
-            <a:spAutoFit/>
-          </a:bodyPr>
-          <a:lstStyle/>
-          <a:p>
-            <a:pPr marL="12700">
-              <a:lnSpc>
-                <a:spcPct val="100000"/>
-              </a:lnSpc>
-              <a:spcBef>
-                <a:spcPts val="100"/>
-              </a:spcBef>
-            </a:pPr>
-            <a:r>
-              <a:rPr lang="en-US" sz="2800" dirty="0">
-                <a:solidFill>
-                  <a:srgbClr val="FFFFFF"/>
-                </a:solidFill>
-                <a:cs typeface="Source Sans Pro Light"/>
-              </a:rPr>
-              <a:t>Problems</a:t>
-            </a:r>
-            <a:endParaRPr lang="en-US" sz="2800" dirty="0">
-              <a:cs typeface="Source Sans Pro Light"/>
-            </a:endParaRPr>
-          </a:p>
-        </p:txBody>
-      </p:sp>
-      <p:sp>
-        <p:nvSpPr>
-          <p:cNvPr id="7" name="object 11">
-            <a:extLst>
-              <a:ext uri="{FF2B5EF4-FFF2-40B4-BE49-F238E27FC236}">
-                <a16:creationId xmlns:a16="http://schemas.microsoft.com/office/drawing/2014/main" id="{A78C4FC4-0761-4346-BD52-349CCA176B1B}"/>
-              </a:ext>
-            </a:extLst>
-          </p:cNvPr>
-          <p:cNvSpPr txBox="1"/>
-          <p:nvPr/>
-        </p:nvSpPr>
-        <p:spPr>
-          <a:xfrm>
-            <a:off x="818356" y="2333880"/>
-            <a:ext cx="7085806" cy="777136"/>
-          </a:xfrm>
-          <a:prstGeom prst="rect">
-            <a:avLst/>
-          </a:prstGeom>
-        </p:spPr>
-        <p:txBody>
-          <a:bodyPr vert="horz" wrap="square" lIns="0" tIns="12700" rIns="0" bIns="0" rtlCol="0">
-            <a:spAutoFit/>
-          </a:bodyPr>
-          <a:lstStyle/>
-          <a:p>
-            <a:pPr marL="298450" marR="5080" indent="-285750">
-              <a:lnSpc>
-                <a:spcPct val="100000"/>
-              </a:lnSpc>
-              <a:spcBef>
-                <a:spcPts val="100"/>
-              </a:spcBef>
-              <a:buFontTx/>
-              <a:buChar char="-"/>
-            </a:pPr>
-            <a:r>
-              <a:rPr lang="en-US" sz="1600" spc="-10" dirty="0">
-                <a:cs typeface="Source Sans Pro Light"/>
-              </a:rPr>
-              <a:t>Load / Save not functional (yet)</a:t>
-            </a:r>
-          </a:p>
-          <a:p>
-            <a:pPr marL="298450" marR="5080" indent="-285750">
-              <a:lnSpc>
-                <a:spcPct val="100000"/>
-              </a:lnSpc>
-              <a:spcBef>
-                <a:spcPts val="100"/>
-              </a:spcBef>
-              <a:buFontTx/>
-              <a:buChar char="-"/>
-            </a:pPr>
-            <a:r>
-              <a:rPr lang="en-US" sz="1600" spc="-10" dirty="0">
-                <a:cs typeface="Source Sans Pro Light"/>
-              </a:rPr>
-              <a:t>Had some repeated GitHub merge conflicts</a:t>
-            </a:r>
-          </a:p>
-          <a:p>
-            <a:pPr marL="298450" marR="5080" indent="-285750">
-              <a:lnSpc>
-                <a:spcPct val="100000"/>
-              </a:lnSpc>
-              <a:spcBef>
-                <a:spcPts val="100"/>
-              </a:spcBef>
-              <a:buFontTx/>
-              <a:buChar char="-"/>
-            </a:pPr>
-            <a:r>
-              <a:rPr lang="en-US" sz="1600" spc="-10" dirty="0">
-                <a:cs typeface="Source Sans Pro Light"/>
-              </a:rPr>
-              <a:t>GUI was hard to learn / adapt to console output</a:t>
-            </a:r>
-          </a:p>
-        </p:txBody>
-      </p:sp>
-      <p:grpSp>
-        <p:nvGrpSpPr>
-          <p:cNvPr id="8" name="Group 7">
-            <a:extLst>
-              <a:ext uri="{FF2B5EF4-FFF2-40B4-BE49-F238E27FC236}">
-                <a16:creationId xmlns:a16="http://schemas.microsoft.com/office/drawing/2014/main" id="{C99EFDCF-B590-4C31-B96A-011B0F1FA113}"/>
-              </a:ext>
-            </a:extLst>
-          </p:cNvPr>
-          <p:cNvGrpSpPr/>
-          <p:nvPr/>
-        </p:nvGrpSpPr>
-        <p:grpSpPr>
-          <a:xfrm>
-            <a:off x="-23922" y="3822700"/>
-            <a:ext cx="4876800" cy="828000"/>
+            <a:off x="-19844" y="3627179"/>
+            <a:ext cx="3657600" cy="828000"/>
             <a:chOff x="-1" y="546100"/>
             <a:chExt cx="4876800" cy="828000"/>
           </a:xfrm>
@@ -7704,10 +8173,10 @@
         </p:grpSpPr>
         <p:sp>
           <p:nvSpPr>
-            <p:cNvPr id="9" name="object 25">
+            <p:cNvPr id="18" name="object 25">
               <a:extLst>
                 <a:ext uri="{FF2B5EF4-FFF2-40B4-BE49-F238E27FC236}">
-                  <a16:creationId xmlns:a16="http://schemas.microsoft.com/office/drawing/2014/main" id="{95822C5C-7AF7-4BAE-9111-24FC53E94C07}"/>
+                  <a16:creationId xmlns:a16="http://schemas.microsoft.com/office/drawing/2014/main" id="{060F604F-3D8D-47E9-AA57-16D2F3927962}"/>
                 </a:ext>
               </a:extLst>
             </p:cNvPr>
@@ -7797,10 +8266,10 @@
         </p:sp>
         <p:sp>
           <p:nvSpPr>
-            <p:cNvPr id="10" name="object 25">
+            <p:cNvPr id="19" name="object 25">
               <a:extLst>
                 <a:ext uri="{FF2B5EF4-FFF2-40B4-BE49-F238E27FC236}">
-                  <a16:creationId xmlns:a16="http://schemas.microsoft.com/office/drawing/2014/main" id="{E17F780B-1F52-40C8-AA66-56F061D6269A}"/>
+                  <a16:creationId xmlns:a16="http://schemas.microsoft.com/office/drawing/2014/main" id="{2DF2D8AE-FF0D-40AE-8FF3-98907342DA3B}"/>
                 </a:ext>
               </a:extLst>
             </p:cNvPr>
@@ -7891,220 +8360,10 @@
       </p:grpSp>
       <p:sp>
         <p:nvSpPr>
-          <p:cNvPr id="11" name="object 11">
+          <p:cNvPr id="16" name="object 25">
             <a:extLst>
               <a:ext uri="{FF2B5EF4-FFF2-40B4-BE49-F238E27FC236}">
-                <a16:creationId xmlns:a16="http://schemas.microsoft.com/office/drawing/2014/main" id="{F790507A-ACA1-427F-81A1-B976B729111C}"/>
-              </a:ext>
-            </a:extLst>
-          </p:cNvPr>
-          <p:cNvSpPr txBox="1"/>
-          <p:nvPr/>
-        </p:nvSpPr>
-        <p:spPr>
-          <a:xfrm>
-            <a:off x="967472" y="4813828"/>
-            <a:ext cx="7085806" cy="2331407"/>
-          </a:xfrm>
-          <a:prstGeom prst="rect">
-            <a:avLst/>
-          </a:prstGeom>
-        </p:spPr>
-        <p:txBody>
-          <a:bodyPr vert="horz" wrap="square" lIns="0" tIns="12700" rIns="0" bIns="0" rtlCol="0">
-            <a:spAutoFit/>
-          </a:bodyPr>
-          <a:lstStyle/>
-          <a:p>
-            <a:pPr marL="298450" marR="5080" indent="-285750">
-              <a:lnSpc>
-                <a:spcPct val="100000"/>
-              </a:lnSpc>
-              <a:spcBef>
-                <a:spcPts val="100"/>
-              </a:spcBef>
-              <a:buFontTx/>
-              <a:buChar char="-"/>
-            </a:pPr>
-            <a:r>
-              <a:rPr lang="en-US" sz="1600" spc="-10" dirty="0">
-                <a:cs typeface="Source Sans Pro Light"/>
-              </a:rPr>
-              <a:t>Pivotal Tracker was a good predictor of iteration deliverables and workload</a:t>
-            </a:r>
-          </a:p>
-          <a:p>
-            <a:pPr marL="298450" marR="5080" indent="-285750">
-              <a:lnSpc>
-                <a:spcPct val="100000"/>
-              </a:lnSpc>
-              <a:spcBef>
-                <a:spcPts val="100"/>
-              </a:spcBef>
-              <a:buFontTx/>
-              <a:buChar char="-"/>
-            </a:pPr>
-            <a:r>
-              <a:rPr lang="en-US" sz="1600" spc="-10" dirty="0">
-                <a:cs typeface="Source Sans Pro Light"/>
-              </a:rPr>
-              <a:t>Teamwork allowed us to:</a:t>
-            </a:r>
-          </a:p>
-          <a:p>
-            <a:pPr marL="755650" marR="5080" lvl="1" indent="-285750">
-              <a:spcBef>
-                <a:spcPts val="100"/>
-              </a:spcBef>
-              <a:buFontTx/>
-              <a:buChar char="-"/>
-            </a:pPr>
-            <a:r>
-              <a:rPr lang="en-US" sz="1600" spc="-10" dirty="0">
-                <a:cs typeface="Source Sans Pro Light"/>
-              </a:rPr>
-              <a:t>Lean on each others’ strengths</a:t>
-            </a:r>
-          </a:p>
-          <a:p>
-            <a:pPr marL="755650" marR="5080" lvl="1" indent="-285750">
-              <a:spcBef>
-                <a:spcPts val="100"/>
-              </a:spcBef>
-              <a:buFontTx/>
-              <a:buChar char="-"/>
-            </a:pPr>
-            <a:r>
-              <a:rPr lang="en-US" sz="1600" spc="-10" dirty="0">
-                <a:cs typeface="Source Sans Pro Light"/>
-              </a:rPr>
-              <a:t>Divide and Conquer (no pun intended)</a:t>
-            </a:r>
-          </a:p>
-          <a:p>
-            <a:pPr marL="755650" marR="5080" lvl="1" indent="-285750">
-              <a:spcBef>
-                <a:spcPts val="100"/>
-              </a:spcBef>
-              <a:buFontTx/>
-              <a:buChar char="-"/>
-            </a:pPr>
-            <a:r>
-              <a:rPr lang="en-US" sz="1600" spc="-10" dirty="0">
-                <a:cs typeface="Source Sans Pro Light"/>
-              </a:rPr>
-              <a:t>Identify what we wanted to learn / work on (GUI, SQLite)</a:t>
-            </a:r>
-          </a:p>
-          <a:p>
-            <a:pPr marL="298450" marR="5080" indent="-285750">
-              <a:spcBef>
-                <a:spcPts val="100"/>
-              </a:spcBef>
-              <a:buFontTx/>
-              <a:buChar char="-"/>
-            </a:pPr>
-            <a:r>
-              <a:rPr lang="en-US" sz="1600" spc="-10" dirty="0">
-                <a:cs typeface="Source Sans Pro Light"/>
-              </a:rPr>
-              <a:t>Communication was key</a:t>
-            </a:r>
-          </a:p>
-          <a:p>
-            <a:pPr marL="755650" marR="5080" lvl="1" indent="-285750">
-              <a:spcBef>
-                <a:spcPts val="100"/>
-              </a:spcBef>
-              <a:buFontTx/>
-              <a:buChar char="-"/>
-            </a:pPr>
-            <a:r>
-              <a:rPr lang="en-US" sz="1600" spc="-10" dirty="0">
-                <a:cs typeface="Source Sans Pro Light"/>
-              </a:rPr>
-              <a:t>(semi) weekly meetings, confidence booster, kept us on track</a:t>
-            </a:r>
-          </a:p>
-          <a:p>
-            <a:pPr marL="298450" marR="5080" indent="-285750">
-              <a:spcBef>
-                <a:spcPts val="100"/>
-              </a:spcBef>
-              <a:buFontTx/>
-              <a:buChar char="-"/>
-            </a:pPr>
-            <a:endParaRPr lang="en-US" sz="1600" spc="-10" dirty="0">
-              <a:cs typeface="Source Sans Pro Light"/>
-            </a:endParaRPr>
-          </a:p>
-          <a:p>
-            <a:pPr marL="755650" marR="5080" lvl="1" indent="-285750">
-              <a:spcBef>
-                <a:spcPts val="100"/>
-              </a:spcBef>
-              <a:buFontTx/>
-              <a:buChar char="-"/>
-            </a:pPr>
-            <a:endParaRPr lang="en-US" sz="1600" dirty="0">
-              <a:cs typeface="Source Sans Pro Light"/>
-            </a:endParaRPr>
-          </a:p>
-        </p:txBody>
-      </p:sp>
-      <p:sp>
-        <p:nvSpPr>
-          <p:cNvPr id="12" name="object 22">
-            <a:extLst>
-              <a:ext uri="{FF2B5EF4-FFF2-40B4-BE49-F238E27FC236}">
-                <a16:creationId xmlns:a16="http://schemas.microsoft.com/office/drawing/2014/main" id="{A03E4914-0112-4E71-8F04-DDD7D03B5CCD}"/>
-              </a:ext>
-            </a:extLst>
-          </p:cNvPr>
-          <p:cNvSpPr txBox="1"/>
-          <p:nvPr/>
-        </p:nvSpPr>
-        <p:spPr>
-          <a:xfrm>
-            <a:off x="660400" y="4018509"/>
-            <a:ext cx="4806156" cy="443711"/>
-          </a:xfrm>
-          <a:prstGeom prst="rect">
-            <a:avLst/>
-          </a:prstGeom>
-        </p:spPr>
-        <p:txBody>
-          <a:bodyPr vert="horz" wrap="square" lIns="0" tIns="12700" rIns="0" bIns="0" rtlCol="0">
-            <a:spAutoFit/>
-          </a:bodyPr>
-          <a:lstStyle/>
-          <a:p>
-            <a:pPr marL="12700">
-              <a:spcBef>
-                <a:spcPts val="100"/>
-              </a:spcBef>
-            </a:pPr>
-            <a:r>
-              <a:rPr lang="en-US" sz="2800" spc="-10" dirty="0">
-                <a:solidFill>
-                  <a:srgbClr val="FFFFFF"/>
-                </a:solidFill>
-                <a:cs typeface="Source Sans Pro Light"/>
-              </a:rPr>
-              <a:t>Lessons Learned</a:t>
-            </a:r>
-            <a:endParaRPr sz="2800" dirty="0">
-              <a:cs typeface="Source Sans Pro Light"/>
-            </a:endParaRPr>
-          </a:p>
-        </p:txBody>
-      </p:sp>
-      <p:sp>
-        <p:nvSpPr>
-          <p:cNvPr id="13" name="object 25">
-            <a:extLst>
-              <a:ext uri="{FF2B5EF4-FFF2-40B4-BE49-F238E27FC236}">
-                <a16:creationId xmlns:a16="http://schemas.microsoft.com/office/drawing/2014/main" id="{8B066141-8E9E-4C12-8E4A-038028F5B660}"/>
+                <a16:creationId xmlns:a16="http://schemas.microsoft.com/office/drawing/2014/main" id="{D20F30AF-0882-4D6A-BE20-AA11056F3F8F}"/>
               </a:ext>
             </a:extLst>
           </p:cNvPr>
@@ -8113,8 +8372,8 @@
         </p:nvSpPr>
         <p:spPr>
           <a:xfrm>
-            <a:off x="-19844" y="7409738"/>
-            <a:ext cx="4629150" cy="828000"/>
+            <a:off x="1" y="1703010"/>
+            <a:ext cx="2442568" cy="828000"/>
           </a:xfrm>
           <a:custGeom>
             <a:avLst/>
@@ -8183,7 +8442,7 @@
             </a:pathLst>
           </a:custGeom>
           <a:solidFill>
-            <a:srgbClr val="FF8201"/>
+            <a:srgbClr val="00B0F0"/>
           </a:solidFill>
         </p:spPr>
         <p:txBody>
@@ -8196,10 +8455,10 @@
       </p:sp>
       <p:sp>
         <p:nvSpPr>
-          <p:cNvPr id="14" name="object 26">
+          <p:cNvPr id="5" name="object 4">
             <a:extLst>
               <a:ext uri="{FF2B5EF4-FFF2-40B4-BE49-F238E27FC236}">
-                <a16:creationId xmlns:a16="http://schemas.microsoft.com/office/drawing/2014/main" id="{E7FF5B71-0689-4C78-9CEF-7FAB953A659C}"/>
+                <a16:creationId xmlns:a16="http://schemas.microsoft.com/office/drawing/2014/main" id="{8E517B89-6564-4443-A785-2B1B6912B7DC}"/>
               </a:ext>
             </a:extLst>
           </p:cNvPr>
@@ -8208,8 +8467,8 @@
         </p:nvSpPr>
         <p:spPr>
           <a:xfrm>
-            <a:off x="675672" y="7601883"/>
-            <a:ext cx="3658394" cy="443711"/>
+            <a:off x="665956" y="1854989"/>
+            <a:ext cx="9601200" cy="443711"/>
           </a:xfrm>
           <a:prstGeom prst="rect">
             <a:avLst/>
@@ -8222,20 +8481,23 @@
           <a:lstStyle/>
           <a:p>
             <a:pPr marL="12700">
+              <a:lnSpc>
+                <a:spcPct val="100000"/>
+              </a:lnSpc>
               <a:spcBef>
                 <a:spcPts val="100"/>
               </a:spcBef>
             </a:pPr>
             <a:r>
-              <a:rPr lang="en-US" sz="2800" spc="-30" dirty="0">
+              <a:rPr lang="en-US" sz="2800" dirty="0">
                 <a:solidFill>
                   <a:srgbClr val="FFFFFF"/>
                 </a:solidFill>
                 <a:cs typeface="Source Sans Pro Light"/>
               </a:rPr>
-              <a:t>Potential Improvements</a:t>
-            </a:r>
-            <a:endParaRPr sz="2800" dirty="0">
+              <a:t>Problems</a:t>
+            </a:r>
+            <a:endParaRPr lang="en-US" sz="2800" dirty="0">
               <a:cs typeface="Source Sans Pro Light"/>
             </a:endParaRPr>
           </a:p>
@@ -8243,10 +8505,10 @@
       </p:sp>
       <p:sp>
         <p:nvSpPr>
-          <p:cNvPr id="22" name="object 11">
+          <p:cNvPr id="7" name="object 11">
             <a:extLst>
               <a:ext uri="{FF2B5EF4-FFF2-40B4-BE49-F238E27FC236}">
-                <a16:creationId xmlns:a16="http://schemas.microsoft.com/office/drawing/2014/main" id="{563088B8-63FC-4E9D-A4AF-FA55698F2269}"/>
+                <a16:creationId xmlns:a16="http://schemas.microsoft.com/office/drawing/2014/main" id="{A78C4FC4-0761-4346-BD52-349CCA176B1B}"/>
               </a:ext>
             </a:extLst>
           </p:cNvPr>
@@ -8255,8 +8517,8 @@
         </p:nvSpPr>
         <p:spPr>
           <a:xfrm>
-            <a:off x="818356" y="8486209"/>
-            <a:ext cx="7085806" cy="1036181"/>
+            <a:off x="818356" y="2760635"/>
+            <a:ext cx="7085806" cy="259045"/>
           </a:xfrm>
           <a:prstGeom prst="rect">
             <a:avLst/>
@@ -8282,9 +8544,37 @@
               <a:rPr lang="en-US" sz="1600" spc="-10" dirty="0">
                 <a:cs typeface="Source Sans Pro Light"/>
               </a:rPr>
-              <a:t>More GUI development for a more fun user experience</a:t>
-            </a:r>
-          </a:p>
+              <a:t>Had some repeated GitHub merge conflicts</a:t>
+            </a:r>
+          </a:p>
+        </p:txBody>
+      </p:sp>
+      <p:sp>
+        <p:nvSpPr>
+          <p:cNvPr id="11" name="object 11">
+            <a:extLst>
+              <a:ext uri="{FF2B5EF4-FFF2-40B4-BE49-F238E27FC236}">
+                <a16:creationId xmlns:a16="http://schemas.microsoft.com/office/drawing/2014/main" id="{F790507A-ACA1-427F-81A1-B976B729111C}"/>
+              </a:ext>
+            </a:extLst>
+          </p:cNvPr>
+          <p:cNvSpPr txBox="1"/>
+          <p:nvPr/>
+        </p:nvSpPr>
+        <p:spPr>
+          <a:xfrm>
+            <a:off x="967472" y="4630983"/>
+            <a:ext cx="7085806" cy="3095719"/>
+          </a:xfrm>
+          <a:prstGeom prst="rect">
+            <a:avLst/>
+          </a:prstGeom>
+        </p:spPr>
+        <p:txBody>
+          <a:bodyPr vert="horz" wrap="square" lIns="0" tIns="12700" rIns="0" bIns="0" rtlCol="0">
+            <a:spAutoFit/>
+          </a:bodyPr>
+          <a:lstStyle/>
           <a:p>
             <a:pPr marL="298450" marR="5080" indent="-285750">
               <a:lnSpc>
@@ -8300,7 +8590,70 @@
               <a:rPr lang="en-US" sz="1600" spc="-10" dirty="0">
                 <a:cs typeface="Source Sans Pro Light"/>
               </a:rPr>
-              <a:t>Difficulty levels / questions based on age / knowledge / topic</a:t>
+              <a:t>Pivotal Tracker was a good predictor of iteration deliverables and workload</a:t>
+            </a:r>
+          </a:p>
+          <a:p>
+            <a:pPr marL="298450" marR="5080" indent="-285750">
+              <a:lnSpc>
+                <a:spcPct val="100000"/>
+              </a:lnSpc>
+              <a:spcBef>
+                <a:spcPts val="100"/>
+              </a:spcBef>
+              <a:buFontTx/>
+              <a:buChar char="-"/>
+            </a:pPr>
+            <a:r>
+              <a:rPr lang="en-US" sz="1600" spc="-10" dirty="0">
+                <a:cs typeface="Source Sans Pro Light"/>
+              </a:rPr>
+              <a:t>Teamwork allowed us to:</a:t>
+            </a:r>
+          </a:p>
+          <a:p>
+            <a:pPr marL="755650" marR="5080" lvl="1" indent="-285750">
+              <a:spcBef>
+                <a:spcPts val="100"/>
+              </a:spcBef>
+              <a:buFontTx/>
+              <a:buChar char="-"/>
+            </a:pPr>
+            <a:r>
+              <a:rPr lang="en-US" sz="1600" spc="-10" dirty="0">
+                <a:cs typeface="Source Sans Pro Light"/>
+              </a:rPr>
+              <a:t>Lean on each others’ strengths</a:t>
+            </a:r>
+          </a:p>
+          <a:p>
+            <a:pPr marL="755650" marR="5080" lvl="1" indent="-285750">
+              <a:spcBef>
+                <a:spcPts val="100"/>
+              </a:spcBef>
+              <a:buFontTx/>
+              <a:buChar char="-"/>
+            </a:pPr>
+            <a:r>
+              <a:rPr lang="en-US" sz="1600" spc="-10" dirty="0">
+                <a:cs typeface="Source Sans Pro Light"/>
+              </a:rPr>
+              <a:t>Divide and Conquer (no pun intended)</a:t>
+            </a:r>
+          </a:p>
+          <a:p>
+            <a:pPr marL="755650" marR="5080" lvl="1" indent="-285750">
+              <a:spcBef>
+                <a:spcPts val="100"/>
+              </a:spcBef>
+              <a:buFontTx/>
+              <a:buChar char="-"/>
+            </a:pPr>
+            <a:r>
+              <a:rPr lang="en-US" sz="1600" spc="-10" dirty="0">
+                <a:cs typeface="Source Sans Pro Light"/>
+              </a:rPr>
+              <a:t>Identify what we wanted to learn / work on (GUI, SQLite)</a:t>
             </a:r>
           </a:p>
           <a:p>
@@ -8315,21 +8668,363 @@
               <a:rPr lang="en-US" sz="1600" spc="-10" dirty="0">
                 <a:cs typeface="Source Sans Pro Light"/>
               </a:rPr>
-              <a:t>Keyboard input not functional</a:t>
-            </a:r>
-          </a:p>
-          <a:p>
-            <a:pPr marL="12700" marR="5080">
+              <a:t>Communication was key</a:t>
+            </a:r>
+          </a:p>
+          <a:p>
+            <a:pPr marL="755650" marR="5080" lvl="1" indent="-285750">
+              <a:spcBef>
+                <a:spcPts val="100"/>
+              </a:spcBef>
+              <a:buFontTx/>
+              <a:buChar char="-"/>
+            </a:pPr>
+            <a:r>
+              <a:rPr lang="en-US" sz="1600" spc="-10" dirty="0">
+                <a:cs typeface="Source Sans Pro Light"/>
+              </a:rPr>
+              <a:t>(semi) weekly meetings, confidence booster, kept us on track</a:t>
+            </a:r>
+          </a:p>
+          <a:p>
+            <a:pPr marL="298450" marR="5080" indent="-285750">
+              <a:spcBef>
+                <a:spcPts val="100"/>
+              </a:spcBef>
+              <a:buFontTx/>
+              <a:buChar char="-"/>
+            </a:pPr>
+            <a:r>
+              <a:rPr lang="en-US" sz="1600" spc="-10" dirty="0">
+                <a:cs typeface="Source Sans Pro Light"/>
+              </a:rPr>
+              <a:t>Started with Console development to ensure logic, then adapted to GUI</a:t>
+            </a:r>
+          </a:p>
+          <a:p>
+            <a:pPr marL="755650" marR="5080" lvl="1" indent="-285750">
+              <a:spcBef>
+                <a:spcPts val="100"/>
+              </a:spcBef>
+              <a:buFontTx/>
+              <a:buChar char="-"/>
+            </a:pPr>
+            <a:r>
+              <a:rPr lang="en-US" sz="1600" spc="-10" dirty="0">
+                <a:cs typeface="Source Sans Pro Light"/>
+              </a:rPr>
+              <a:t>Probably could have saved some time to build exclusively into GUI environment</a:t>
+            </a:r>
+          </a:p>
+          <a:p>
+            <a:pPr marL="298450" marR="5080" indent="-285750">
+              <a:spcBef>
+                <a:spcPts val="100"/>
+              </a:spcBef>
+              <a:buFontTx/>
+              <a:buChar char="-"/>
+            </a:pPr>
+            <a:endParaRPr lang="en-US" sz="1600" spc="-10" dirty="0">
+              <a:cs typeface="Source Sans Pro Light"/>
+            </a:endParaRPr>
+          </a:p>
+          <a:p>
+            <a:pPr marL="755650" marR="5080" lvl="1" indent="-285750">
+              <a:spcBef>
+                <a:spcPts val="100"/>
+              </a:spcBef>
+              <a:buFontTx/>
+              <a:buChar char="-"/>
+            </a:pPr>
+            <a:endParaRPr lang="en-US" sz="1600" dirty="0">
+              <a:cs typeface="Source Sans Pro Light"/>
+            </a:endParaRPr>
+          </a:p>
+        </p:txBody>
+      </p:sp>
+      <p:sp>
+        <p:nvSpPr>
+          <p:cNvPr id="12" name="object 22">
+            <a:extLst>
+              <a:ext uri="{FF2B5EF4-FFF2-40B4-BE49-F238E27FC236}">
+                <a16:creationId xmlns:a16="http://schemas.microsoft.com/office/drawing/2014/main" id="{A03E4914-0112-4E71-8F04-DDD7D03B5CCD}"/>
+              </a:ext>
+            </a:extLst>
+          </p:cNvPr>
+          <p:cNvSpPr txBox="1"/>
+          <p:nvPr/>
+        </p:nvSpPr>
+        <p:spPr>
+          <a:xfrm>
+            <a:off x="660400" y="3835664"/>
+            <a:ext cx="4806156" cy="443711"/>
+          </a:xfrm>
+          <a:prstGeom prst="rect">
+            <a:avLst/>
+          </a:prstGeom>
+        </p:spPr>
+        <p:txBody>
+          <a:bodyPr vert="horz" wrap="square" lIns="0" tIns="12700" rIns="0" bIns="0" rtlCol="0">
+            <a:spAutoFit/>
+          </a:bodyPr>
+          <a:lstStyle/>
+          <a:p>
+            <a:pPr marL="12700">
+              <a:spcBef>
+                <a:spcPts val="100"/>
+              </a:spcBef>
+            </a:pPr>
+            <a:r>
+              <a:rPr lang="en-US" sz="2800" spc="-10" dirty="0">
+                <a:solidFill>
+                  <a:srgbClr val="FFFFFF"/>
+                </a:solidFill>
+                <a:cs typeface="Source Sans Pro Light"/>
+              </a:rPr>
+              <a:t>Lessons Learned</a:t>
+            </a:r>
+            <a:endParaRPr sz="2800" dirty="0">
+              <a:cs typeface="Source Sans Pro Light"/>
+            </a:endParaRPr>
+          </a:p>
+        </p:txBody>
+      </p:sp>
+      <p:sp>
+        <p:nvSpPr>
+          <p:cNvPr id="13" name="object 25">
+            <a:extLst>
+              <a:ext uri="{FF2B5EF4-FFF2-40B4-BE49-F238E27FC236}">
+                <a16:creationId xmlns:a16="http://schemas.microsoft.com/office/drawing/2014/main" id="{8B066141-8E9E-4C12-8E4A-038028F5B660}"/>
+              </a:ext>
+            </a:extLst>
+          </p:cNvPr>
+          <p:cNvSpPr/>
+          <p:nvPr/>
+        </p:nvSpPr>
+        <p:spPr>
+          <a:xfrm>
+            <a:off x="-19844" y="7836493"/>
+            <a:ext cx="4872722" cy="828000"/>
+          </a:xfrm>
+          <a:custGeom>
+            <a:avLst/>
+            <a:gdLst/>
+            <a:ahLst/>
+            <a:cxnLst/>
+            <a:rect l="l" t="t" r="r" b="b"/>
+            <a:pathLst>
+              <a:path w="1955164" h="437514">
+                <a:moveTo>
+                  <a:pt x="1736031" y="0"/>
+                </a:moveTo>
+                <a:lnTo>
+                  <a:pt x="0" y="0"/>
+                </a:lnTo>
+                <a:lnTo>
+                  <a:pt x="0" y="437153"/>
+                </a:lnTo>
+                <a:lnTo>
+                  <a:pt x="1736031" y="437153"/>
+                </a:lnTo>
+                <a:lnTo>
+                  <a:pt x="1786148" y="431380"/>
+                </a:lnTo>
+                <a:lnTo>
+                  <a:pt x="1832155" y="414936"/>
+                </a:lnTo>
+                <a:lnTo>
+                  <a:pt x="1872739" y="389134"/>
+                </a:lnTo>
+                <a:lnTo>
+                  <a:pt x="1906588" y="355285"/>
+                </a:lnTo>
+                <a:lnTo>
+                  <a:pt x="1932391" y="314701"/>
+                </a:lnTo>
+                <a:lnTo>
+                  <a:pt x="1948834" y="268694"/>
+                </a:lnTo>
+                <a:lnTo>
+                  <a:pt x="1954607" y="218577"/>
+                </a:lnTo>
+                <a:lnTo>
+                  <a:pt x="1948834" y="168459"/>
+                </a:lnTo>
+                <a:lnTo>
+                  <a:pt x="1932391" y="122452"/>
+                </a:lnTo>
+                <a:lnTo>
+                  <a:pt x="1906588" y="81868"/>
+                </a:lnTo>
+                <a:lnTo>
+                  <a:pt x="1872739" y="48018"/>
+                </a:lnTo>
+                <a:lnTo>
+                  <a:pt x="1832155" y="22216"/>
+                </a:lnTo>
+                <a:lnTo>
+                  <a:pt x="1786148" y="5772"/>
+                </a:lnTo>
+                <a:lnTo>
+                  <a:pt x="1736031" y="0"/>
+                </a:lnTo>
+                <a:close/>
+              </a:path>
+            </a:pathLst>
+          </a:custGeom>
+          <a:solidFill>
+            <a:srgbClr val="FF8201"/>
+          </a:solidFill>
+        </p:spPr>
+        <p:txBody>
+          <a:bodyPr wrap="square" lIns="0" tIns="0" rIns="0" bIns="0" rtlCol="0"/>
+          <a:lstStyle/>
+          <a:p>
+            <a:endParaRPr/>
+          </a:p>
+        </p:txBody>
+      </p:sp>
+      <p:sp>
+        <p:nvSpPr>
+          <p:cNvPr id="14" name="object 26">
+            <a:extLst>
+              <a:ext uri="{FF2B5EF4-FFF2-40B4-BE49-F238E27FC236}">
+                <a16:creationId xmlns:a16="http://schemas.microsoft.com/office/drawing/2014/main" id="{E7FF5B71-0689-4C78-9CEF-7FAB953A659C}"/>
+              </a:ext>
+            </a:extLst>
+          </p:cNvPr>
+          <p:cNvSpPr txBox="1"/>
+          <p:nvPr/>
+        </p:nvSpPr>
+        <p:spPr>
+          <a:xfrm>
+            <a:off x="675672" y="8028638"/>
+            <a:ext cx="3658394" cy="443711"/>
+          </a:xfrm>
+          <a:prstGeom prst="rect">
+            <a:avLst/>
+          </a:prstGeom>
+        </p:spPr>
+        <p:txBody>
+          <a:bodyPr vert="horz" wrap="square" lIns="0" tIns="12700" rIns="0" bIns="0" rtlCol="0">
+            <a:spAutoFit/>
+          </a:bodyPr>
+          <a:lstStyle/>
+          <a:p>
+            <a:pPr marL="12700">
+              <a:spcBef>
+                <a:spcPts val="100"/>
+              </a:spcBef>
+            </a:pPr>
+            <a:r>
+              <a:rPr lang="en-US" sz="2800" spc="-30" dirty="0">
+                <a:solidFill>
+                  <a:srgbClr val="FFFFFF"/>
+                </a:solidFill>
+                <a:cs typeface="Source Sans Pro Light"/>
+              </a:rPr>
+              <a:t>Potential Improvements</a:t>
+            </a:r>
+            <a:endParaRPr sz="2800" dirty="0">
+              <a:cs typeface="Source Sans Pro Light"/>
+            </a:endParaRPr>
+          </a:p>
+        </p:txBody>
+      </p:sp>
+      <p:sp>
+        <p:nvSpPr>
+          <p:cNvPr id="22" name="object 11">
+            <a:extLst>
+              <a:ext uri="{FF2B5EF4-FFF2-40B4-BE49-F238E27FC236}">
+                <a16:creationId xmlns:a16="http://schemas.microsoft.com/office/drawing/2014/main" id="{563088B8-63FC-4E9D-A4AF-FA55698F2269}"/>
+              </a:ext>
+            </a:extLst>
+          </p:cNvPr>
+          <p:cNvSpPr txBox="1"/>
+          <p:nvPr/>
+        </p:nvSpPr>
+        <p:spPr>
+          <a:xfrm>
+            <a:off x="818356" y="8912964"/>
+            <a:ext cx="7085806" cy="1036181"/>
+          </a:xfrm>
+          <a:prstGeom prst="rect">
+            <a:avLst/>
+          </a:prstGeom>
+        </p:spPr>
+        <p:txBody>
+          <a:bodyPr vert="horz" wrap="square" lIns="0" tIns="12700" rIns="0" bIns="0" rtlCol="0">
+            <a:spAutoFit/>
+          </a:bodyPr>
+          <a:lstStyle/>
+          <a:p>
+            <a:pPr marL="298450" marR="5080" indent="-285750">
               <a:lnSpc>
                 <a:spcPct val="100000"/>
               </a:lnSpc>
               <a:spcBef>
                 <a:spcPts val="100"/>
               </a:spcBef>
+              <a:buFontTx/>
+              <a:buChar char="-"/>
             </a:pPr>
-            <a:endParaRPr lang="en-US" sz="1600" spc="-10" dirty="0">
-              <a:cs typeface="Source Sans Pro Light"/>
-            </a:endParaRPr>
+            <a:r>
+              <a:rPr lang="en-US" sz="1600" spc="-10" dirty="0">
+                <a:cs typeface="Source Sans Pro Light"/>
+              </a:rPr>
+              <a:t>More GUI development for a more fun user experience</a:t>
+            </a:r>
+          </a:p>
+          <a:p>
+            <a:pPr marL="755650" marR="5080" lvl="1" indent="-285750">
+              <a:spcBef>
+                <a:spcPts val="100"/>
+              </a:spcBef>
+              <a:buFontTx/>
+              <a:buChar char="-"/>
+            </a:pPr>
+            <a:r>
+              <a:rPr lang="en-US" sz="1600" spc="-10" dirty="0">
+                <a:cs typeface="Source Sans Pro Light"/>
+              </a:rPr>
+              <a:t>Animations, [better] sounds, </a:t>
+            </a:r>
+          </a:p>
+          <a:p>
+            <a:pPr marL="298450" marR="5080" indent="-285750">
+              <a:lnSpc>
+                <a:spcPct val="100000"/>
+              </a:lnSpc>
+              <a:spcBef>
+                <a:spcPts val="100"/>
+              </a:spcBef>
+              <a:buFontTx/>
+              <a:buChar char="-"/>
+            </a:pPr>
+            <a:r>
+              <a:rPr lang="en-US" sz="1600" spc="-10" dirty="0">
+                <a:cs typeface="Source Sans Pro Light"/>
+              </a:rPr>
+              <a:t>Difficulty levels / questions based on age / knowledge / topic</a:t>
+            </a:r>
+          </a:p>
+          <a:p>
+            <a:pPr marL="298450" marR="5080" indent="-285750">
+              <a:lnSpc>
+                <a:spcPct val="100000"/>
+              </a:lnSpc>
+              <a:spcBef>
+                <a:spcPts val="100"/>
+              </a:spcBef>
+              <a:buFontTx/>
+              <a:buChar char="-"/>
+            </a:pPr>
+            <a:r>
+              <a:rPr lang="en-US" sz="1600" spc="-10" dirty="0">
+                <a:cs typeface="Source Sans Pro Light"/>
+              </a:rPr>
+              <a:t>Improved text / formatting</a:t>
+            </a:r>
           </a:p>
         </p:txBody>
       </p:sp>
@@ -8362,7 +9057,7 @@
         </p:blipFill>
         <p:spPr bwMode="auto">
           <a:xfrm>
-            <a:off x="10348975" y="1970515"/>
+            <a:off x="10419556" y="2890157"/>
             <a:ext cx="5844902" cy="5844902"/>
           </a:xfrm>
           <a:prstGeom prst="rect">
@@ -8380,6 +9075,419 @@
           </a:extLst>
         </p:spPr>
       </p:pic>
+      <p:sp>
+        <p:nvSpPr>
+          <p:cNvPr id="27" name="object 3">
+            <a:extLst>
+              <a:ext uri="{FF2B5EF4-FFF2-40B4-BE49-F238E27FC236}">
+                <a16:creationId xmlns:a16="http://schemas.microsoft.com/office/drawing/2014/main" id="{49F690A4-3D72-4671-BC01-FB0A06844A15}"/>
+              </a:ext>
+            </a:extLst>
+          </p:cNvPr>
+          <p:cNvSpPr/>
+          <p:nvPr/>
+        </p:nvSpPr>
+        <p:spPr>
+          <a:xfrm>
+            <a:off x="14255325" y="0"/>
+            <a:ext cx="4759806" cy="1112119"/>
+          </a:xfrm>
+          <a:custGeom>
+            <a:avLst/>
+            <a:gdLst/>
+            <a:ahLst/>
+            <a:cxnLst/>
+            <a:rect l="l" t="t" r="r" b="b"/>
+            <a:pathLst>
+              <a:path w="1883409" h="440055">
+                <a:moveTo>
+                  <a:pt x="0" y="0"/>
+                </a:moveTo>
+                <a:lnTo>
+                  <a:pt x="0" y="439737"/>
+                </a:lnTo>
+                <a:lnTo>
+                  <a:pt x="1883155" y="439737"/>
+                </a:lnTo>
+                <a:lnTo>
+                  <a:pt x="1883155" y="0"/>
+                </a:lnTo>
+                <a:lnTo>
+                  <a:pt x="0" y="0"/>
+                </a:lnTo>
+                <a:close/>
+              </a:path>
+            </a:pathLst>
+          </a:custGeom>
+          <a:solidFill>
+            <a:srgbClr val="FF8200"/>
+          </a:solidFill>
+        </p:spPr>
+        <p:txBody>
+          <a:bodyPr wrap="square" lIns="0" tIns="0" rIns="0" bIns="0" rtlCol="0"/>
+          <a:lstStyle/>
+          <a:p>
+            <a:endParaRPr dirty="0"/>
+          </a:p>
+        </p:txBody>
+      </p:sp>
+      <p:sp>
+        <p:nvSpPr>
+          <p:cNvPr id="28" name="object 2">
+            <a:extLst>
+              <a:ext uri="{FF2B5EF4-FFF2-40B4-BE49-F238E27FC236}">
+                <a16:creationId xmlns:a16="http://schemas.microsoft.com/office/drawing/2014/main" id="{113369B8-1220-4569-B0C9-C5316088A299}"/>
+              </a:ext>
+            </a:extLst>
+          </p:cNvPr>
+          <p:cNvSpPr/>
+          <p:nvPr/>
+        </p:nvSpPr>
+        <p:spPr>
+          <a:xfrm>
+            <a:off x="4754987" y="0"/>
+            <a:ext cx="4782272" cy="1112119"/>
+          </a:xfrm>
+          <a:custGeom>
+            <a:avLst/>
+            <a:gdLst/>
+            <a:ahLst/>
+            <a:cxnLst/>
+            <a:rect l="l" t="t" r="r" b="b"/>
+            <a:pathLst>
+              <a:path w="1892300" h="440055">
+                <a:moveTo>
+                  <a:pt x="0" y="439737"/>
+                </a:moveTo>
+                <a:lnTo>
+                  <a:pt x="1892300" y="439737"/>
+                </a:lnTo>
+                <a:lnTo>
+                  <a:pt x="1892300" y="0"/>
+                </a:lnTo>
+                <a:lnTo>
+                  <a:pt x="0" y="0"/>
+                </a:lnTo>
+                <a:lnTo>
+                  <a:pt x="0" y="439737"/>
+                </a:lnTo>
+                <a:close/>
+              </a:path>
+            </a:pathLst>
+          </a:custGeom>
+          <a:solidFill>
+            <a:srgbClr val="FFBF00"/>
+          </a:solidFill>
+        </p:spPr>
+        <p:txBody>
+          <a:bodyPr wrap="square" lIns="0" tIns="0" rIns="0" bIns="0" rtlCol="0"/>
+          <a:lstStyle/>
+          <a:p>
+            <a:endParaRPr/>
+          </a:p>
+        </p:txBody>
+      </p:sp>
+      <p:sp>
+        <p:nvSpPr>
+          <p:cNvPr id="29" name="object 2">
+            <a:extLst>
+              <a:ext uri="{FF2B5EF4-FFF2-40B4-BE49-F238E27FC236}">
+                <a16:creationId xmlns:a16="http://schemas.microsoft.com/office/drawing/2014/main" id="{D187C7DC-3F64-43D5-809E-58415D628EA6}"/>
+              </a:ext>
+            </a:extLst>
+          </p:cNvPr>
+          <p:cNvSpPr/>
+          <p:nvPr/>
+        </p:nvSpPr>
+        <p:spPr>
+          <a:xfrm>
+            <a:off x="9505156" y="0"/>
+            <a:ext cx="4782272" cy="1112119"/>
+          </a:xfrm>
+          <a:custGeom>
+            <a:avLst/>
+            <a:gdLst/>
+            <a:ahLst/>
+            <a:cxnLst/>
+            <a:rect l="l" t="t" r="r" b="b"/>
+            <a:pathLst>
+              <a:path w="1892300" h="440055">
+                <a:moveTo>
+                  <a:pt x="0" y="439737"/>
+                </a:moveTo>
+                <a:lnTo>
+                  <a:pt x="1892300" y="439737"/>
+                </a:lnTo>
+                <a:lnTo>
+                  <a:pt x="1892300" y="0"/>
+                </a:lnTo>
+                <a:lnTo>
+                  <a:pt x="0" y="0"/>
+                </a:lnTo>
+                <a:lnTo>
+                  <a:pt x="0" y="439737"/>
+                </a:lnTo>
+                <a:close/>
+              </a:path>
+            </a:pathLst>
+          </a:custGeom>
+          <a:solidFill>
+            <a:srgbClr val="FFA100"/>
+          </a:solidFill>
+        </p:spPr>
+        <p:txBody>
+          <a:bodyPr wrap="square" lIns="0" tIns="0" rIns="0" bIns="0" rtlCol="0"/>
+          <a:lstStyle/>
+          <a:p>
+            <a:endParaRPr/>
+          </a:p>
+        </p:txBody>
+      </p:sp>
+      <p:grpSp>
+        <p:nvGrpSpPr>
+          <p:cNvPr id="30" name="Group 29">
+            <a:extLst>
+              <a:ext uri="{FF2B5EF4-FFF2-40B4-BE49-F238E27FC236}">
+                <a16:creationId xmlns:a16="http://schemas.microsoft.com/office/drawing/2014/main" id="{30857FEF-7942-4B03-966E-99FCCAD37A71}"/>
+              </a:ext>
+            </a:extLst>
+          </p:cNvPr>
+          <p:cNvGrpSpPr/>
+          <p:nvPr/>
+        </p:nvGrpSpPr>
+        <p:grpSpPr>
+          <a:xfrm>
+            <a:off x="0" y="0"/>
+            <a:ext cx="19010313" cy="1112119"/>
+            <a:chOff x="-324644" y="2222500"/>
+            <a:chExt cx="22261685" cy="1302327"/>
+          </a:xfrm>
+        </p:grpSpPr>
+        <p:sp>
+          <p:nvSpPr>
+            <p:cNvPr id="31" name="object 2">
+              <a:extLst>
+                <a:ext uri="{FF2B5EF4-FFF2-40B4-BE49-F238E27FC236}">
+                  <a16:creationId xmlns:a16="http://schemas.microsoft.com/office/drawing/2014/main" id="{89FED919-6AF0-478C-B985-6C768D735981}"/>
+                </a:ext>
+              </a:extLst>
+            </p:cNvPr>
+            <p:cNvSpPr/>
+            <p:nvPr/>
+          </p:nvSpPr>
+          <p:spPr>
+            <a:xfrm>
+              <a:off x="-324644" y="2222500"/>
+              <a:ext cx="5600193" cy="1302327"/>
+            </a:xfrm>
+            <a:custGeom>
+              <a:avLst/>
+              <a:gdLst/>
+              <a:ahLst/>
+              <a:cxnLst/>
+              <a:rect l="l" t="t" r="r" b="b"/>
+              <a:pathLst>
+                <a:path w="1892300" h="440055">
+                  <a:moveTo>
+                    <a:pt x="0" y="439737"/>
+                  </a:moveTo>
+                  <a:lnTo>
+                    <a:pt x="1892300" y="439737"/>
+                  </a:lnTo>
+                  <a:lnTo>
+                    <a:pt x="1892300" y="0"/>
+                  </a:lnTo>
+                  <a:lnTo>
+                    <a:pt x="0" y="0"/>
+                  </a:lnTo>
+                  <a:lnTo>
+                    <a:pt x="0" y="439737"/>
+                  </a:lnTo>
+                  <a:close/>
+                </a:path>
+              </a:pathLst>
+            </a:custGeom>
+            <a:solidFill>
+              <a:srgbClr val="009EF3"/>
+            </a:solidFill>
+          </p:spPr>
+          <p:txBody>
+            <a:bodyPr wrap="square" lIns="0" tIns="0" rIns="0" bIns="0" rtlCol="0"/>
+            <a:lstStyle/>
+            <a:p>
+              <a:endParaRPr/>
+            </a:p>
+          </p:txBody>
+        </p:sp>
+        <p:sp>
+          <p:nvSpPr>
+            <p:cNvPr id="32" name="object 3">
+              <a:extLst>
+                <a:ext uri="{FF2B5EF4-FFF2-40B4-BE49-F238E27FC236}">
+                  <a16:creationId xmlns:a16="http://schemas.microsoft.com/office/drawing/2014/main" id="{1FCDBEE5-919B-43FB-AD5C-0BF39F2CB6C9}"/>
+                </a:ext>
+              </a:extLst>
+            </p:cNvPr>
+            <p:cNvSpPr/>
+            <p:nvPr/>
+          </p:nvSpPr>
+          <p:spPr>
+            <a:xfrm>
+              <a:off x="16363156" y="2222500"/>
+              <a:ext cx="5573885" cy="1302327"/>
+            </a:xfrm>
+            <a:custGeom>
+              <a:avLst/>
+              <a:gdLst/>
+              <a:ahLst/>
+              <a:cxnLst/>
+              <a:rect l="l" t="t" r="r" b="b"/>
+              <a:pathLst>
+                <a:path w="1883409" h="440055">
+                  <a:moveTo>
+                    <a:pt x="0" y="0"/>
+                  </a:moveTo>
+                  <a:lnTo>
+                    <a:pt x="0" y="439737"/>
+                  </a:lnTo>
+                  <a:lnTo>
+                    <a:pt x="1883155" y="439737"/>
+                  </a:lnTo>
+                  <a:lnTo>
+                    <a:pt x="1883155" y="0"/>
+                  </a:lnTo>
+                  <a:lnTo>
+                    <a:pt x="0" y="0"/>
+                  </a:lnTo>
+                  <a:close/>
+                </a:path>
+              </a:pathLst>
+            </a:custGeom>
+            <a:solidFill>
+              <a:srgbClr val="FF8200"/>
+            </a:solidFill>
+          </p:spPr>
+          <p:txBody>
+            <a:bodyPr wrap="square" lIns="0" tIns="0" rIns="0" bIns="0" rtlCol="0"/>
+            <a:lstStyle/>
+            <a:p>
+              <a:endParaRPr dirty="0"/>
+            </a:p>
+          </p:txBody>
+        </p:sp>
+        <p:sp>
+          <p:nvSpPr>
+            <p:cNvPr id="33" name="object 2">
+              <a:extLst>
+                <a:ext uri="{FF2B5EF4-FFF2-40B4-BE49-F238E27FC236}">
+                  <a16:creationId xmlns:a16="http://schemas.microsoft.com/office/drawing/2014/main" id="{756D0976-9F6A-4518-A056-3BFB9B0B1585}"/>
+                </a:ext>
+              </a:extLst>
+            </p:cNvPr>
+            <p:cNvSpPr/>
+            <p:nvPr/>
+          </p:nvSpPr>
+          <p:spPr>
+            <a:xfrm>
+              <a:off x="5237956" y="2222500"/>
+              <a:ext cx="5600193" cy="1302327"/>
+            </a:xfrm>
+            <a:custGeom>
+              <a:avLst/>
+              <a:gdLst/>
+              <a:ahLst/>
+              <a:cxnLst/>
+              <a:rect l="l" t="t" r="r" b="b"/>
+              <a:pathLst>
+                <a:path w="1892300" h="440055">
+                  <a:moveTo>
+                    <a:pt x="0" y="439737"/>
+                  </a:moveTo>
+                  <a:lnTo>
+                    <a:pt x="1892300" y="439737"/>
+                  </a:lnTo>
+                  <a:lnTo>
+                    <a:pt x="1892300" y="0"/>
+                  </a:lnTo>
+                  <a:lnTo>
+                    <a:pt x="0" y="0"/>
+                  </a:lnTo>
+                  <a:lnTo>
+                    <a:pt x="0" y="439737"/>
+                  </a:lnTo>
+                  <a:close/>
+                </a:path>
+              </a:pathLst>
+            </a:custGeom>
+            <a:solidFill>
+              <a:srgbClr val="FFBF00"/>
+            </a:solidFill>
+          </p:spPr>
+          <p:txBody>
+            <a:bodyPr wrap="square" lIns="0" tIns="0" rIns="0" bIns="0" rtlCol="0"/>
+            <a:lstStyle/>
+            <a:p>
+              <a:endParaRPr/>
+            </a:p>
+          </p:txBody>
+        </p:sp>
+        <p:sp>
+          <p:nvSpPr>
+            <p:cNvPr id="34" name="object 2">
+              <a:extLst>
+                <a:ext uri="{FF2B5EF4-FFF2-40B4-BE49-F238E27FC236}">
+                  <a16:creationId xmlns:a16="http://schemas.microsoft.com/office/drawing/2014/main" id="{8CD76AF4-702C-4179-A1EB-0CDCD3B8C608}"/>
+                </a:ext>
+              </a:extLst>
+            </p:cNvPr>
+            <p:cNvSpPr/>
+            <p:nvPr/>
+          </p:nvSpPr>
+          <p:spPr>
+            <a:xfrm>
+              <a:off x="10800556" y="2222500"/>
+              <a:ext cx="5600193" cy="1302327"/>
+            </a:xfrm>
+            <a:custGeom>
+              <a:avLst/>
+              <a:gdLst/>
+              <a:ahLst/>
+              <a:cxnLst/>
+              <a:rect l="l" t="t" r="r" b="b"/>
+              <a:pathLst>
+                <a:path w="1892300" h="440055">
+                  <a:moveTo>
+                    <a:pt x="0" y="439737"/>
+                  </a:moveTo>
+                  <a:lnTo>
+                    <a:pt x="1892300" y="439737"/>
+                  </a:lnTo>
+                  <a:lnTo>
+                    <a:pt x="1892300" y="0"/>
+                  </a:lnTo>
+                  <a:lnTo>
+                    <a:pt x="0" y="0"/>
+                  </a:lnTo>
+                  <a:lnTo>
+                    <a:pt x="0" y="439737"/>
+                  </a:lnTo>
+                  <a:close/>
+                </a:path>
+              </a:pathLst>
+            </a:custGeom>
+            <a:solidFill>
+              <a:srgbClr val="FFA100"/>
+            </a:solidFill>
+          </p:spPr>
+          <p:txBody>
+            <a:bodyPr wrap="square" lIns="0" tIns="0" rIns="0" bIns="0" rtlCol="0"/>
+            <a:lstStyle/>
+            <a:p>
+              <a:endParaRPr/>
+            </a:p>
+          </p:txBody>
+        </p:sp>
+      </p:grpSp>
     </p:spTree>
     <p:extLst>
       <p:ext uri="{BB962C8B-B14F-4D97-AF65-F5344CB8AC3E}">

</xml_diff>